<commit_message>
[ssc] added filtering stage
</commit_message>
<xml_diff>
--- a/models/simscape/analysis/analysis.pptx
+++ b/models/simscape/analysis/analysis.pptx
@@ -22,6 +22,10 @@
     <p:sldId id="273" r:id="rId16"/>
     <p:sldId id="274" r:id="rId17"/>
     <p:sldId id="275" r:id="rId18"/>
+    <p:sldId id="278" r:id="rId19"/>
+    <p:sldId id="279" r:id="rId20"/>
+    <p:sldId id="276" r:id="rId21"/>
+    <p:sldId id="277" r:id="rId22"/>
   </p:sldIdLst>
   <p:sldSz cx="12192000" cy="6858000"/>
   <p:notesSz cx="6858000" cy="9144000"/>
@@ -2573,6 +2577,212 @@
 </p:sld>
 </file>
 
+<file path=ppt/slides/slide18.xml><?xml version="1.0" encoding="utf-8"?>
+<p:sld xmlns:a="http://schemas.openxmlformats.org/drawingml/2006/main" xmlns:r="http://schemas.openxmlformats.org/officeDocument/2006/relationships" xmlns:p="http://schemas.openxmlformats.org/presentationml/2006/main">
+  <p:cSld>
+    <p:spTree>
+      <p:nvGrpSpPr>
+        <p:cNvPr id="1" name=""/>
+        <p:cNvGrpSpPr/>
+        <p:nvPr/>
+      </p:nvGrpSpPr>
+      <p:grpSpPr>
+        <a:xfrm>
+          <a:off x="0" y="0"/>
+          <a:ext cx="0" cy="0"/>
+          <a:chOff x="0" y="0"/>
+          <a:chExt cx="0" cy="0"/>
+        </a:xfrm>
+      </p:grpSpPr>
+      <p:sp>
+        <p:nvSpPr>
+          <p:cNvPr id="2" name="TextBox 1">
+            <a:extLst>
+              <a:ext uri="{FF2B5EF4-FFF2-40B4-BE49-F238E27FC236}">
+                <a16:creationId xmlns:a16="http://schemas.microsoft.com/office/drawing/2014/main" id="{E5542B49-B554-420F-B437-801A3D42C308}"/>
+              </a:ext>
+            </a:extLst>
+          </p:cNvPr>
+          <p:cNvSpPr txBox="1"/>
+          <p:nvPr/>
+        </p:nvSpPr>
+        <p:spPr>
+          <a:xfrm>
+            <a:off x="95250" y="104775"/>
+            <a:ext cx="4554388" cy="523220"/>
+          </a:xfrm>
+          <a:prstGeom prst="rect">
+            <a:avLst/>
+          </a:prstGeom>
+          <a:noFill/>
+        </p:spPr>
+        <p:txBody>
+          <a:bodyPr wrap="none" rtlCol="0">
+            <a:spAutoFit/>
+          </a:bodyPr>
+          <a:lstStyle/>
+          <a:p>
+            <a:r>
+              <a:rPr lang="en-US" sz="2800" b="1" dirty="0" err="1">
+                <a:solidFill>
+                  <a:srgbClr val="0070C0"/>
+                </a:solidFill>
+              </a:rPr>
+              <a:t>Simscape</a:t>
+            </a:r>
+            <a:r>
+              <a:rPr lang="en-US" sz="2800" b="1" dirty="0">
+                <a:solidFill>
+                  <a:srgbClr val="0070C0"/>
+                </a:solidFill>
+              </a:rPr>
+              <a:t> Model (w/ sensors)</a:t>
+            </a:r>
+          </a:p>
+        </p:txBody>
+      </p:sp>
+      <p:pic>
+        <p:nvPicPr>
+          <p:cNvPr id="3" name="Picture 2">
+            <a:extLst>
+              <a:ext uri="{FF2B5EF4-FFF2-40B4-BE49-F238E27FC236}">
+                <a16:creationId xmlns:a16="http://schemas.microsoft.com/office/drawing/2014/main" id="{28E3E967-45AC-4036-A5AA-35741D62C58B}"/>
+              </a:ext>
+            </a:extLst>
+          </p:cNvPr>
+          <p:cNvPicPr>
+            <a:picLocks noChangeAspect="1"/>
+          </p:cNvPicPr>
+          <p:nvPr/>
+        </p:nvPicPr>
+        <p:blipFill>
+          <a:blip r:embed="rId2"/>
+          <a:stretch>
+            <a:fillRect/>
+          </a:stretch>
+        </p:blipFill>
+        <p:spPr>
+          <a:xfrm>
+            <a:off x="778599" y="1127239"/>
+            <a:ext cx="10270353" cy="5536112"/>
+          </a:xfrm>
+          <a:prstGeom prst="rect">
+            <a:avLst/>
+          </a:prstGeom>
+        </p:spPr>
+      </p:pic>
+    </p:spTree>
+    <p:extLst>
+      <p:ext uri="{BB962C8B-B14F-4D97-AF65-F5344CB8AC3E}">
+        <p14:creationId xmlns:p14="http://schemas.microsoft.com/office/powerpoint/2010/main" val="2464479170"/>
+      </p:ext>
+    </p:extLst>
+  </p:cSld>
+  <p:clrMapOvr>
+    <a:masterClrMapping/>
+  </p:clrMapOvr>
+</p:sld>
+</file>
+
+<file path=ppt/slides/slide19.xml><?xml version="1.0" encoding="utf-8"?>
+<p:sld xmlns:a="http://schemas.openxmlformats.org/drawingml/2006/main" xmlns:r="http://schemas.openxmlformats.org/officeDocument/2006/relationships" xmlns:p="http://schemas.openxmlformats.org/presentationml/2006/main">
+  <p:cSld>
+    <p:spTree>
+      <p:nvGrpSpPr>
+        <p:cNvPr id="1" name=""/>
+        <p:cNvGrpSpPr/>
+        <p:nvPr/>
+      </p:nvGrpSpPr>
+      <p:grpSpPr>
+        <a:xfrm>
+          <a:off x="0" y="0"/>
+          <a:ext cx="0" cy="0"/>
+          <a:chOff x="0" y="0"/>
+          <a:chExt cx="0" cy="0"/>
+        </a:xfrm>
+      </p:grpSpPr>
+      <p:pic>
+        <p:nvPicPr>
+          <p:cNvPr id="2" name="Picture 1">
+            <a:extLst>
+              <a:ext uri="{FF2B5EF4-FFF2-40B4-BE49-F238E27FC236}">
+                <a16:creationId xmlns:a16="http://schemas.microsoft.com/office/drawing/2014/main" id="{8B30355C-F631-4608-9590-95FBC17C1F6D}"/>
+              </a:ext>
+            </a:extLst>
+          </p:cNvPr>
+          <p:cNvPicPr>
+            <a:picLocks noChangeAspect="1"/>
+          </p:cNvPicPr>
+          <p:nvPr/>
+        </p:nvPicPr>
+        <p:blipFill>
+          <a:blip r:embed="rId2"/>
+          <a:stretch>
+            <a:fillRect/>
+          </a:stretch>
+        </p:blipFill>
+        <p:spPr>
+          <a:xfrm>
+            <a:off x="642796" y="1114950"/>
+            <a:ext cx="10254558" cy="5527598"/>
+          </a:xfrm>
+          <a:prstGeom prst="rect">
+            <a:avLst/>
+          </a:prstGeom>
+        </p:spPr>
+      </p:pic>
+      <p:sp>
+        <p:nvSpPr>
+          <p:cNvPr id="3" name="TextBox 2">
+            <a:extLst>
+              <a:ext uri="{FF2B5EF4-FFF2-40B4-BE49-F238E27FC236}">
+                <a16:creationId xmlns:a16="http://schemas.microsoft.com/office/drawing/2014/main" id="{324A01C3-CCD3-4EDF-AFF8-1B2B5F228D3E}"/>
+              </a:ext>
+            </a:extLst>
+          </p:cNvPr>
+          <p:cNvSpPr txBox="1"/>
+          <p:nvPr/>
+        </p:nvSpPr>
+        <p:spPr>
+          <a:xfrm>
+            <a:off x="95250" y="104775"/>
+            <a:ext cx="1683794" cy="523220"/>
+          </a:xfrm>
+          <a:prstGeom prst="rect">
+            <a:avLst/>
+          </a:prstGeom>
+          <a:noFill/>
+        </p:spPr>
+        <p:txBody>
+          <a:bodyPr wrap="none" rtlCol="0">
+            <a:spAutoFit/>
+          </a:bodyPr>
+          <a:lstStyle/>
+          <a:p>
+            <a:r>
+              <a:rPr lang="en-US" sz="2800" b="1" dirty="0">
+                <a:solidFill>
+                  <a:srgbClr val="0070C0"/>
+                </a:solidFill>
+              </a:rPr>
+              <a:t>Controller</a:t>
+            </a:r>
+          </a:p>
+        </p:txBody>
+      </p:sp>
+    </p:spTree>
+    <p:extLst>
+      <p:ext uri="{BB962C8B-B14F-4D97-AF65-F5344CB8AC3E}">
+        <p14:creationId xmlns:p14="http://schemas.microsoft.com/office/powerpoint/2010/main" val="3844403784"/>
+      </p:ext>
+    </p:extLst>
+  </p:cSld>
+  <p:clrMapOvr>
+    <a:masterClrMapping/>
+  </p:clrMapOvr>
+</p:sld>
+</file>
+
 <file path=ppt/slides/slide2.xml><?xml version="1.0" encoding="utf-8"?>
 <p:sld xmlns:a="http://schemas.openxmlformats.org/drawingml/2006/main" xmlns:r="http://schemas.openxmlformats.org/officeDocument/2006/relationships" xmlns:p="http://schemas.openxmlformats.org/presentationml/2006/main">
   <p:cSld>
@@ -2671,6 +2881,204 @@
     <p:extLst>
       <p:ext uri="{BB962C8B-B14F-4D97-AF65-F5344CB8AC3E}">
         <p14:creationId xmlns:p14="http://schemas.microsoft.com/office/powerpoint/2010/main" val="1611541614"/>
+      </p:ext>
+    </p:extLst>
+  </p:cSld>
+  <p:clrMapOvr>
+    <a:masterClrMapping/>
+  </p:clrMapOvr>
+</p:sld>
+</file>
+
+<file path=ppt/slides/slide20.xml><?xml version="1.0" encoding="utf-8"?>
+<p:sld xmlns:a="http://schemas.openxmlformats.org/drawingml/2006/main" xmlns:r="http://schemas.openxmlformats.org/officeDocument/2006/relationships" xmlns:p="http://schemas.openxmlformats.org/presentationml/2006/main">
+  <p:cSld>
+    <p:spTree>
+      <p:nvGrpSpPr>
+        <p:cNvPr id="1" name=""/>
+        <p:cNvGrpSpPr/>
+        <p:nvPr/>
+      </p:nvGrpSpPr>
+      <p:grpSpPr>
+        <a:xfrm>
+          <a:off x="0" y="0"/>
+          <a:ext cx="0" cy="0"/>
+          <a:chOff x="0" y="0"/>
+          <a:chExt cx="0" cy="0"/>
+        </a:xfrm>
+      </p:grpSpPr>
+      <p:sp>
+        <p:nvSpPr>
+          <p:cNvPr id="2" name="TextBox 1">
+            <a:extLst>
+              <a:ext uri="{FF2B5EF4-FFF2-40B4-BE49-F238E27FC236}">
+                <a16:creationId xmlns:a16="http://schemas.microsoft.com/office/drawing/2014/main" id="{59E5665D-3379-40D0-8817-FD0C98372C54}"/>
+              </a:ext>
+            </a:extLst>
+          </p:cNvPr>
+          <p:cNvSpPr txBox="1"/>
+          <p:nvPr/>
+        </p:nvSpPr>
+        <p:spPr>
+          <a:xfrm>
+            <a:off x="95250" y="104775"/>
+            <a:ext cx="5926751" cy="523220"/>
+          </a:xfrm>
+          <a:prstGeom prst="rect">
+            <a:avLst/>
+          </a:prstGeom>
+          <a:noFill/>
+        </p:spPr>
+        <p:txBody>
+          <a:bodyPr wrap="none" rtlCol="0">
+            <a:spAutoFit/>
+          </a:bodyPr>
+          <a:lstStyle/>
+          <a:p>
+            <a:r>
+              <a:rPr lang="en-US" sz="2800" b="1" dirty="0">
+                <a:solidFill>
+                  <a:srgbClr val="0070C0"/>
+                </a:solidFill>
+              </a:rPr>
+              <a:t>AP + CFB: Volume Control (w/ sensors)</a:t>
+            </a:r>
+          </a:p>
+        </p:txBody>
+      </p:sp>
+      <p:pic>
+        <p:nvPicPr>
+          <p:cNvPr id="4" name="Picture 3">
+            <a:extLst>
+              <a:ext uri="{FF2B5EF4-FFF2-40B4-BE49-F238E27FC236}">
+                <a16:creationId xmlns:a16="http://schemas.microsoft.com/office/drawing/2014/main" id="{55B8FC0C-D929-4D37-9AB6-BA4E9AE739D6}"/>
+              </a:ext>
+            </a:extLst>
+          </p:cNvPr>
+          <p:cNvPicPr>
+            <a:picLocks noChangeAspect="1"/>
+          </p:cNvPicPr>
+          <p:nvPr/>
+        </p:nvPicPr>
+        <p:blipFill>
+          <a:blip r:embed="rId2"/>
+          <a:stretch>
+            <a:fillRect/>
+          </a:stretch>
+        </p:blipFill>
+        <p:spPr>
+          <a:xfrm>
+            <a:off x="402336" y="877824"/>
+            <a:ext cx="10560653" cy="5860066"/>
+          </a:xfrm>
+          <a:prstGeom prst="rect">
+            <a:avLst/>
+          </a:prstGeom>
+        </p:spPr>
+      </p:pic>
+    </p:spTree>
+    <p:extLst>
+      <p:ext uri="{BB962C8B-B14F-4D97-AF65-F5344CB8AC3E}">
+        <p14:creationId xmlns:p14="http://schemas.microsoft.com/office/powerpoint/2010/main" val="3517033425"/>
+      </p:ext>
+    </p:extLst>
+  </p:cSld>
+  <p:clrMapOvr>
+    <a:masterClrMapping/>
+  </p:clrMapOvr>
+</p:sld>
+</file>
+
+<file path=ppt/slides/slide21.xml><?xml version="1.0" encoding="utf-8"?>
+<p:sld xmlns:a="http://schemas.openxmlformats.org/drawingml/2006/main" xmlns:r="http://schemas.openxmlformats.org/officeDocument/2006/relationships" xmlns:p="http://schemas.openxmlformats.org/presentationml/2006/main">
+  <p:cSld>
+    <p:spTree>
+      <p:nvGrpSpPr>
+        <p:cNvPr id="1" name=""/>
+        <p:cNvGrpSpPr/>
+        <p:nvPr/>
+      </p:nvGrpSpPr>
+      <p:grpSpPr>
+        <a:xfrm>
+          <a:off x="0" y="0"/>
+          <a:ext cx="0" cy="0"/>
+          <a:chOff x="0" y="0"/>
+          <a:chExt cx="0" cy="0"/>
+        </a:xfrm>
+      </p:grpSpPr>
+      <p:sp>
+        <p:nvSpPr>
+          <p:cNvPr id="2" name="TextBox 1">
+            <a:extLst>
+              <a:ext uri="{FF2B5EF4-FFF2-40B4-BE49-F238E27FC236}">
+                <a16:creationId xmlns:a16="http://schemas.microsoft.com/office/drawing/2014/main" id="{59E5665D-3379-40D0-8817-FD0C98372C54}"/>
+              </a:ext>
+            </a:extLst>
+          </p:cNvPr>
+          <p:cNvSpPr txBox="1"/>
+          <p:nvPr/>
+        </p:nvSpPr>
+        <p:spPr>
+          <a:xfrm>
+            <a:off x="95250" y="104775"/>
+            <a:ext cx="6065187" cy="523220"/>
+          </a:xfrm>
+          <a:prstGeom prst="rect">
+            <a:avLst/>
+          </a:prstGeom>
+          <a:noFill/>
+        </p:spPr>
+        <p:txBody>
+          <a:bodyPr wrap="none" rtlCol="0">
+            <a:spAutoFit/>
+          </a:bodyPr>
+          <a:lstStyle/>
+          <a:p>
+            <a:r>
+              <a:rPr lang="en-US" sz="2800" b="1" dirty="0">
+                <a:solidFill>
+                  <a:srgbClr val="0070C0"/>
+                </a:solidFill>
+              </a:rPr>
+              <a:t>AP + CFB: Pressure Control (w/ sensors)</a:t>
+            </a:r>
+          </a:p>
+        </p:txBody>
+      </p:sp>
+      <p:pic>
+        <p:nvPicPr>
+          <p:cNvPr id="5" name="Picture 4">
+            <a:extLst>
+              <a:ext uri="{FF2B5EF4-FFF2-40B4-BE49-F238E27FC236}">
+                <a16:creationId xmlns:a16="http://schemas.microsoft.com/office/drawing/2014/main" id="{659E3AB1-3941-47C2-A689-6C38BB05744A}"/>
+              </a:ext>
+            </a:extLst>
+          </p:cNvPr>
+          <p:cNvPicPr>
+            <a:picLocks noChangeAspect="1"/>
+          </p:cNvPicPr>
+          <p:nvPr/>
+        </p:nvPicPr>
+        <p:blipFill>
+          <a:blip r:embed="rId2"/>
+          <a:stretch>
+            <a:fillRect/>
+          </a:stretch>
+        </p:blipFill>
+        <p:spPr>
+          <a:xfrm>
+            <a:off x="402336" y="877824"/>
+            <a:ext cx="10560653" cy="5860066"/>
+          </a:xfrm>
+          <a:prstGeom prst="rect">
+            <a:avLst/>
+          </a:prstGeom>
+        </p:spPr>
+      </p:pic>
+    </p:spTree>
+    <p:extLst>
+      <p:ext uri="{BB962C8B-B14F-4D97-AF65-F5344CB8AC3E}">
+        <p14:creationId xmlns:p14="http://schemas.microsoft.com/office/powerpoint/2010/main" val="2587667636"/>
       </p:ext>
     </p:extLst>
   </p:cSld>

</xml_diff>

<commit_message>
[ssc] control at 100Hz
</commit_message>
<xml_diff>
--- a/models/simscape/analysis/analysis.pptx
+++ b/models/simscape/analysis/analysis.pptx
@@ -28,6 +28,7 @@
     <p:sldId id="282" r:id="rId22"/>
     <p:sldId id="280" r:id="rId23"/>
     <p:sldId id="281" r:id="rId24"/>
+    <p:sldId id="283" r:id="rId25"/>
   </p:sldIdLst>
   <p:sldSz cx="12192000" cy="6858000"/>
   <p:notesSz cx="6858000" cy="9144000"/>
@@ -2999,6 +3000,45 @@
           </a:prstGeom>
         </p:spPr>
       </p:pic>
+      <p:sp>
+        <p:nvSpPr>
+          <p:cNvPr id="4" name="TextBox 3">
+            <a:extLst>
+              <a:ext uri="{FF2B5EF4-FFF2-40B4-BE49-F238E27FC236}">
+                <a16:creationId xmlns:a16="http://schemas.microsoft.com/office/drawing/2014/main" id="{998F8CFA-4134-4363-874F-86B920C93E67}"/>
+              </a:ext>
+            </a:extLst>
+          </p:cNvPr>
+          <p:cNvSpPr txBox="1"/>
+          <p:nvPr/>
+        </p:nvSpPr>
+        <p:spPr>
+          <a:xfrm>
+            <a:off x="9744386" y="627995"/>
+            <a:ext cx="1218603" cy="461665"/>
+          </a:xfrm>
+          <a:prstGeom prst="rect">
+            <a:avLst/>
+          </a:prstGeom>
+          <a:noFill/>
+        </p:spPr>
+        <p:txBody>
+          <a:bodyPr wrap="none" rtlCol="0">
+            <a:spAutoFit/>
+          </a:bodyPr>
+          <a:lstStyle/>
+          <a:p>
+            <a:r>
+              <a:rPr lang="en-US" sz="2400" b="1" dirty="0">
+                <a:solidFill>
+                  <a:srgbClr val="0070C0"/>
+                </a:solidFill>
+              </a:rPr>
+              <a:t>@ 1 kHz</a:t>
+            </a:r>
+          </a:p>
+        </p:txBody>
+      </p:sp>
     </p:spTree>
     <p:extLst>
       <p:ext uri="{BB962C8B-B14F-4D97-AF65-F5344CB8AC3E}">
@@ -3240,6 +3280,45 @@
           </p:txBody>
         </p:sp>
       </p:grpSp>
+      <p:sp>
+        <p:nvSpPr>
+          <p:cNvPr id="6" name="TextBox 5">
+            <a:extLst>
+              <a:ext uri="{FF2B5EF4-FFF2-40B4-BE49-F238E27FC236}">
+                <a16:creationId xmlns:a16="http://schemas.microsoft.com/office/drawing/2014/main" id="{19C75726-5A8B-4731-9A83-479134600867}"/>
+              </a:ext>
+            </a:extLst>
+          </p:cNvPr>
+          <p:cNvSpPr txBox="1"/>
+          <p:nvPr/>
+        </p:nvSpPr>
+        <p:spPr>
+          <a:xfrm>
+            <a:off x="9744386" y="627995"/>
+            <a:ext cx="1218603" cy="461665"/>
+          </a:xfrm>
+          <a:prstGeom prst="rect">
+            <a:avLst/>
+          </a:prstGeom>
+          <a:noFill/>
+        </p:spPr>
+        <p:txBody>
+          <a:bodyPr wrap="none" rtlCol="0">
+            <a:spAutoFit/>
+          </a:bodyPr>
+          <a:lstStyle/>
+          <a:p>
+            <a:r>
+              <a:rPr lang="en-US" sz="2400" b="1" dirty="0">
+                <a:solidFill>
+                  <a:srgbClr val="0070C0"/>
+                </a:solidFill>
+              </a:rPr>
+              <a:t>@ 1 kHz</a:t>
+            </a:r>
+          </a:p>
+        </p:txBody>
+      </p:sp>
     </p:spTree>
     <p:extLst>
       <p:ext uri="{BB962C8B-B14F-4D97-AF65-F5344CB8AC3E}">
@@ -3436,6 +3515,45 @@
           </p:txBody>
         </p:sp>
       </p:grpSp>
+      <p:sp>
+        <p:nvSpPr>
+          <p:cNvPr id="7" name="TextBox 6">
+            <a:extLst>
+              <a:ext uri="{FF2B5EF4-FFF2-40B4-BE49-F238E27FC236}">
+                <a16:creationId xmlns:a16="http://schemas.microsoft.com/office/drawing/2014/main" id="{3DC46C3E-CB2E-4C01-9DED-2B03A54E388E}"/>
+              </a:ext>
+            </a:extLst>
+          </p:cNvPr>
+          <p:cNvSpPr txBox="1"/>
+          <p:nvPr/>
+        </p:nvSpPr>
+        <p:spPr>
+          <a:xfrm>
+            <a:off x="9744386" y="627995"/>
+            <a:ext cx="1218603" cy="461665"/>
+          </a:xfrm>
+          <a:prstGeom prst="rect">
+            <a:avLst/>
+          </a:prstGeom>
+          <a:noFill/>
+        </p:spPr>
+        <p:txBody>
+          <a:bodyPr wrap="none" rtlCol="0">
+            <a:spAutoFit/>
+          </a:bodyPr>
+          <a:lstStyle/>
+          <a:p>
+            <a:r>
+              <a:rPr lang="en-US" sz="2400" b="1" dirty="0">
+                <a:solidFill>
+                  <a:srgbClr val="0070C0"/>
+                </a:solidFill>
+              </a:rPr>
+              <a:t>@ 1 kHz</a:t>
+            </a:r>
+          </a:p>
+        </p:txBody>
+      </p:sp>
     </p:spTree>
     <p:extLst>
       <p:ext uri="{BB962C8B-B14F-4D97-AF65-F5344CB8AC3E}">
@@ -3546,6 +3664,286 @@
     <p:extLst>
       <p:ext uri="{BB962C8B-B14F-4D97-AF65-F5344CB8AC3E}">
         <p14:creationId xmlns:p14="http://schemas.microsoft.com/office/powerpoint/2010/main" val="3291414827"/>
+      </p:ext>
+    </p:extLst>
+  </p:cSld>
+  <p:clrMapOvr>
+    <a:masterClrMapping/>
+  </p:clrMapOvr>
+</p:sld>
+</file>
+
+<file path=ppt/slides/slide24.xml><?xml version="1.0" encoding="utf-8"?>
+<p:sld xmlns:a="http://schemas.openxmlformats.org/drawingml/2006/main" xmlns:r="http://schemas.openxmlformats.org/officeDocument/2006/relationships" xmlns:p="http://schemas.openxmlformats.org/presentationml/2006/main">
+  <p:cSld>
+    <p:spTree>
+      <p:nvGrpSpPr>
+        <p:cNvPr id="1" name=""/>
+        <p:cNvGrpSpPr/>
+        <p:nvPr/>
+      </p:nvGrpSpPr>
+      <p:grpSpPr>
+        <a:xfrm>
+          <a:off x="0" y="0"/>
+          <a:ext cx="0" cy="0"/>
+          <a:chOff x="0" y="0"/>
+          <a:chExt cx="0" cy="0"/>
+        </a:xfrm>
+      </p:grpSpPr>
+      <p:sp>
+        <p:nvSpPr>
+          <p:cNvPr id="2" name="TextBox 1">
+            <a:extLst>
+              <a:ext uri="{FF2B5EF4-FFF2-40B4-BE49-F238E27FC236}">
+                <a16:creationId xmlns:a16="http://schemas.microsoft.com/office/drawing/2014/main" id="{59E5665D-3379-40D0-8817-FD0C98372C54}"/>
+              </a:ext>
+            </a:extLst>
+          </p:cNvPr>
+          <p:cNvSpPr txBox="1"/>
+          <p:nvPr/>
+        </p:nvSpPr>
+        <p:spPr>
+          <a:xfrm>
+            <a:off x="95250" y="104775"/>
+            <a:ext cx="9939003" cy="523220"/>
+          </a:xfrm>
+          <a:prstGeom prst="rect">
+            <a:avLst/>
+          </a:prstGeom>
+          <a:noFill/>
+        </p:spPr>
+        <p:txBody>
+          <a:bodyPr wrap="none" rtlCol="0">
+            <a:spAutoFit/>
+          </a:bodyPr>
+          <a:lstStyle/>
+          <a:p>
+            <a:r>
+              <a:rPr lang="en-US" sz="2800" b="1" dirty="0">
+                <a:solidFill>
+                  <a:srgbClr val="0070C0"/>
+                </a:solidFill>
+              </a:rPr>
+              <a:t>AP + CFB: Pressure Control </a:t>
+            </a:r>
+            <a:r>
+              <a:rPr lang="en-US" sz="2000" b="1" dirty="0">
+                <a:solidFill>
+                  <a:srgbClr val="0070C0"/>
+                </a:solidFill>
+              </a:rPr>
+              <a:t>w/ feedback-filtering input-shaping, gain-scheduling</a:t>
+            </a:r>
+          </a:p>
+        </p:txBody>
+      </p:sp>
+      <p:grpSp>
+        <p:nvGrpSpPr>
+          <p:cNvPr id="9" name="Group 8">
+            <a:extLst>
+              <a:ext uri="{FF2B5EF4-FFF2-40B4-BE49-F238E27FC236}">
+                <a16:creationId xmlns:a16="http://schemas.microsoft.com/office/drawing/2014/main" id="{FFF244A2-9259-4CF6-84A0-E481B80200C1}"/>
+              </a:ext>
+            </a:extLst>
+          </p:cNvPr>
+          <p:cNvGrpSpPr/>
+          <p:nvPr/>
+        </p:nvGrpSpPr>
+        <p:grpSpPr>
+          <a:xfrm>
+            <a:off x="402336" y="877824"/>
+            <a:ext cx="10560653" cy="5860066"/>
+            <a:chOff x="402336" y="877824"/>
+            <a:chExt cx="10560653" cy="5860066"/>
+          </a:xfrm>
+        </p:grpSpPr>
+        <p:pic>
+          <p:nvPicPr>
+            <p:cNvPr id="5" name="Picture 4">
+              <a:extLst>
+                <a:ext uri="{FF2B5EF4-FFF2-40B4-BE49-F238E27FC236}">
+                  <a16:creationId xmlns:a16="http://schemas.microsoft.com/office/drawing/2014/main" id="{F4ABA3D4-AB42-44C1-A715-79BC308B9A3C}"/>
+                </a:ext>
+              </a:extLst>
+            </p:cNvPr>
+            <p:cNvPicPr>
+              <a:picLocks noChangeAspect="1"/>
+            </p:cNvPicPr>
+            <p:nvPr/>
+          </p:nvPicPr>
+          <p:blipFill>
+            <a:blip r:embed="rId2"/>
+            <a:stretch>
+              <a:fillRect/>
+            </a:stretch>
+          </p:blipFill>
+          <p:spPr>
+            <a:xfrm>
+              <a:off x="402336" y="877824"/>
+              <a:ext cx="10560653" cy="5860066"/>
+            </a:xfrm>
+            <a:prstGeom prst="rect">
+              <a:avLst/>
+            </a:prstGeom>
+          </p:spPr>
+        </p:pic>
+        <p:sp>
+          <p:nvSpPr>
+            <p:cNvPr id="8" name="TextBox 7">
+              <a:extLst>
+                <a:ext uri="{FF2B5EF4-FFF2-40B4-BE49-F238E27FC236}">
+                  <a16:creationId xmlns:a16="http://schemas.microsoft.com/office/drawing/2014/main" id="{B0E6FFAF-A3C8-4FB4-B25E-BE95560F8C7D}"/>
+                </a:ext>
+              </a:extLst>
+            </p:cNvPr>
+            <p:cNvSpPr txBox="1"/>
+            <p:nvPr/>
+          </p:nvSpPr>
+          <p:spPr>
+            <a:xfrm>
+              <a:off x="8390305" y="4544840"/>
+              <a:ext cx="2476897" cy="1938992"/>
+            </a:xfrm>
+            <a:prstGeom prst="rect">
+              <a:avLst/>
+            </a:prstGeom>
+            <a:solidFill>
+              <a:schemeClr val="bg1"/>
+            </a:solidFill>
+            <a:ln>
+              <a:solidFill>
+                <a:schemeClr val="accent1"/>
+              </a:solidFill>
+            </a:ln>
+          </p:spPr>
+          <p:txBody>
+            <a:bodyPr wrap="none" rtlCol="0">
+              <a:spAutoFit/>
+            </a:bodyPr>
+            <a:lstStyle/>
+            <a:p>
+              <a:r>
+                <a:rPr lang="en-US" dirty="0"/>
+                <a:t>Feedback Filtering</a:t>
+              </a:r>
+            </a:p>
+            <a:p>
+              <a:pPr marL="285750" indent="-285750">
+                <a:buFont typeface="Arial" panose="020B0604020202020204" pitchFamily="34" charset="0"/>
+                <a:buChar char="•"/>
+              </a:pPr>
+              <a:r>
+                <a:rPr lang="en-US" sz="1400" dirty="0"/>
+                <a:t>IIR 2</a:t>
+              </a:r>
+              <a:r>
+                <a:rPr lang="en-US" sz="1400" baseline="30000" dirty="0"/>
+                <a:t>nd</a:t>
+              </a:r>
+              <a:r>
+                <a:rPr lang="en-US" sz="1400" dirty="0"/>
+                <a:t> order</a:t>
+              </a:r>
+            </a:p>
+            <a:p>
+              <a:pPr marL="285750" indent="-285750">
+                <a:buFont typeface="Arial" panose="020B0604020202020204" pitchFamily="34" charset="0"/>
+                <a:buChar char="•"/>
+              </a:pPr>
+              <a:r>
+                <a:rPr lang="en-US" sz="1400" dirty="0"/>
+                <a:t>10 Hz cutoff </a:t>
+              </a:r>
+            </a:p>
+            <a:p>
+              <a:pPr marL="285750" indent="-285750">
+                <a:buFont typeface="Arial" panose="020B0604020202020204" pitchFamily="34" charset="0"/>
+                <a:buChar char="•"/>
+              </a:pPr>
+              <a:r>
+                <a:rPr lang="en-US" sz="1400" dirty="0"/>
+                <a:t>25 dB attenuation</a:t>
+              </a:r>
+            </a:p>
+            <a:p>
+              <a:pPr marL="285750" indent="-285750">
+                <a:buFont typeface="Arial" panose="020B0604020202020204" pitchFamily="34" charset="0"/>
+                <a:buChar char="•"/>
+              </a:pPr>
+              <a:r>
+                <a:rPr lang="en-US" sz="1400" dirty="0"/>
+                <a:t>0.1 dB passband max ripple</a:t>
+              </a:r>
+            </a:p>
+            <a:p>
+              <a:pPr marL="285750" indent="-285750">
+                <a:buFont typeface="Arial" panose="020B0604020202020204" pitchFamily="34" charset="0"/>
+                <a:buChar char="•"/>
+              </a:pPr>
+              <a:endParaRPr lang="en-US" sz="1400" dirty="0"/>
+            </a:p>
+            <a:p>
+              <a:r>
+                <a:rPr lang="en-US" dirty="0"/>
+                <a:t>Input Shaping</a:t>
+              </a:r>
+            </a:p>
+            <a:p>
+              <a:pPr marL="285750" indent="-285750">
+                <a:buFont typeface="Arial" panose="020B0604020202020204" pitchFamily="34" charset="0"/>
+                <a:buChar char="•"/>
+              </a:pPr>
+              <a:r>
+                <a:rPr lang="en-US" sz="1400" dirty="0"/>
+                <a:t>Minimum Jerk 3rd order</a:t>
+              </a:r>
+            </a:p>
+          </p:txBody>
+        </p:sp>
+      </p:grpSp>
+      <p:sp>
+        <p:nvSpPr>
+          <p:cNvPr id="7" name="TextBox 6">
+            <a:extLst>
+              <a:ext uri="{FF2B5EF4-FFF2-40B4-BE49-F238E27FC236}">
+                <a16:creationId xmlns:a16="http://schemas.microsoft.com/office/drawing/2014/main" id="{3DC46C3E-CB2E-4C01-9DED-2B03A54E388E}"/>
+              </a:ext>
+            </a:extLst>
+          </p:cNvPr>
+          <p:cNvSpPr txBox="1"/>
+          <p:nvPr/>
+        </p:nvSpPr>
+        <p:spPr>
+          <a:xfrm>
+            <a:off x="9608587" y="627995"/>
+            <a:ext cx="1382110" cy="461665"/>
+          </a:xfrm>
+          <a:prstGeom prst="rect">
+            <a:avLst/>
+          </a:prstGeom>
+          <a:noFill/>
+        </p:spPr>
+        <p:txBody>
+          <a:bodyPr wrap="none" rtlCol="0">
+            <a:spAutoFit/>
+          </a:bodyPr>
+          <a:lstStyle/>
+          <a:p>
+            <a:r>
+              <a:rPr lang="en-US" sz="2400" b="1" dirty="0">
+                <a:solidFill>
+                  <a:srgbClr val="0070C0"/>
+                </a:solidFill>
+              </a:rPr>
+              <a:t>@ 100 Hz</a:t>
+            </a:r>
+          </a:p>
+        </p:txBody>
+      </p:sp>
+    </p:spTree>
+    <p:extLst>
+      <p:ext uri="{BB962C8B-B14F-4D97-AF65-F5344CB8AC3E}">
+        <p14:creationId xmlns:p14="http://schemas.microsoft.com/office/powerpoint/2010/main" val="333066055"/>
       </p:ext>
     </p:extLst>
   </p:cSld>

</xml_diff>

<commit_message>
[ssc] updated analysis AP vs. CP w/ new profiles
</commit_message>
<xml_diff>
--- a/models/simscape/analysis/analysis.pptx
+++ b/models/simscape/analysis/analysis.pptx
@@ -31,6 +31,10 @@
     <p:sldId id="283" r:id="rId25"/>
     <p:sldId id="284" r:id="rId26"/>
     <p:sldId id="285" r:id="rId27"/>
+    <p:sldId id="286" r:id="rId28"/>
+    <p:sldId id="287" r:id="rId29"/>
+    <p:sldId id="288" r:id="rId30"/>
+    <p:sldId id="289" r:id="rId31"/>
   </p:sldIdLst>
   <p:sldSz cx="12192000" cy="6858000"/>
   <p:notesSz cx="6858000" cy="9144000"/>
@@ -4533,6 +4537,623 @@
 </p:sld>
 </file>
 
+<file path=ppt/slides/slide27.xml><?xml version="1.0" encoding="utf-8"?>
+<p:sld xmlns:a="http://schemas.openxmlformats.org/drawingml/2006/main" xmlns:r="http://schemas.openxmlformats.org/officeDocument/2006/relationships" xmlns:p="http://schemas.openxmlformats.org/presentationml/2006/main">
+  <p:cSld>
+    <p:spTree>
+      <p:nvGrpSpPr>
+        <p:cNvPr id="1" name=""/>
+        <p:cNvGrpSpPr/>
+        <p:nvPr/>
+      </p:nvGrpSpPr>
+      <p:grpSpPr>
+        <a:xfrm>
+          <a:off x="0" y="0"/>
+          <a:ext cx="0" cy="0"/>
+          <a:chOff x="0" y="0"/>
+          <a:chExt cx="0" cy="0"/>
+        </a:xfrm>
+      </p:grpSpPr>
+      <p:sp>
+        <p:nvSpPr>
+          <p:cNvPr id="2" name="TextBox 1">
+            <a:extLst>
+              <a:ext uri="{FF2B5EF4-FFF2-40B4-BE49-F238E27FC236}">
+                <a16:creationId xmlns:a16="http://schemas.microsoft.com/office/drawing/2014/main" id="{E5542B49-B554-420F-B437-801A3D42C308}"/>
+              </a:ext>
+            </a:extLst>
+          </p:cNvPr>
+          <p:cNvSpPr txBox="1"/>
+          <p:nvPr/>
+        </p:nvSpPr>
+        <p:spPr>
+          <a:xfrm>
+            <a:off x="95250" y="104775"/>
+            <a:ext cx="3621889" cy="523220"/>
+          </a:xfrm>
+          <a:prstGeom prst="rect">
+            <a:avLst/>
+          </a:prstGeom>
+          <a:noFill/>
+        </p:spPr>
+        <p:txBody>
+          <a:bodyPr wrap="none" rtlCol="0">
+            <a:spAutoFit/>
+          </a:bodyPr>
+          <a:lstStyle/>
+          <a:p>
+            <a:r>
+              <a:rPr lang="en-US" sz="2800" b="1" dirty="0" err="1">
+                <a:solidFill>
+                  <a:srgbClr val="0070C0"/>
+                </a:solidFill>
+              </a:rPr>
+              <a:t>Simscape</a:t>
+            </a:r>
+            <a:r>
+              <a:rPr lang="en-US" sz="2800" b="1" dirty="0">
+                <a:solidFill>
+                  <a:srgbClr val="0070C0"/>
+                </a:solidFill>
+              </a:rPr>
+              <a:t> Model </a:t>
+            </a:r>
+            <a:r>
+              <a:rPr lang="en-US" sz="2000" b="1" dirty="0">
+                <a:solidFill>
+                  <a:srgbClr val="0070C0"/>
+                </a:solidFill>
+              </a:rPr>
+              <a:t>(update)</a:t>
+            </a:r>
+          </a:p>
+        </p:txBody>
+      </p:sp>
+      <p:pic>
+        <p:nvPicPr>
+          <p:cNvPr id="4" name="Picture 3">
+            <a:extLst>
+              <a:ext uri="{FF2B5EF4-FFF2-40B4-BE49-F238E27FC236}">
+                <a16:creationId xmlns:a16="http://schemas.microsoft.com/office/drawing/2014/main" id="{E797F079-0A12-4FC5-9D0C-6F45BE684222}"/>
+              </a:ext>
+            </a:extLst>
+          </p:cNvPr>
+          <p:cNvPicPr>
+            <a:picLocks noChangeAspect="1"/>
+          </p:cNvPicPr>
+          <p:nvPr/>
+        </p:nvPicPr>
+        <p:blipFill>
+          <a:blip r:embed="rId2"/>
+          <a:stretch>
+            <a:fillRect/>
+          </a:stretch>
+        </p:blipFill>
+        <p:spPr>
+          <a:xfrm>
+            <a:off x="239352" y="1160921"/>
+            <a:ext cx="10892776" cy="5592304"/>
+          </a:xfrm>
+          <a:prstGeom prst="rect">
+            <a:avLst/>
+          </a:prstGeom>
+        </p:spPr>
+      </p:pic>
+    </p:spTree>
+    <p:extLst>
+      <p:ext uri="{BB962C8B-B14F-4D97-AF65-F5344CB8AC3E}">
+        <p14:creationId xmlns:p14="http://schemas.microsoft.com/office/powerpoint/2010/main" val="3684920766"/>
+      </p:ext>
+    </p:extLst>
+  </p:cSld>
+  <p:clrMapOvr>
+    <a:masterClrMapping/>
+  </p:clrMapOvr>
+</p:sld>
+</file>
+
+<file path=ppt/slides/slide28.xml><?xml version="1.0" encoding="utf-8"?>
+<p:sld xmlns:a="http://schemas.openxmlformats.org/drawingml/2006/main" xmlns:r="http://schemas.openxmlformats.org/officeDocument/2006/relationships" xmlns:p="http://schemas.openxmlformats.org/presentationml/2006/main">
+  <p:cSld>
+    <p:spTree>
+      <p:nvGrpSpPr>
+        <p:cNvPr id="1" name=""/>
+        <p:cNvGrpSpPr/>
+        <p:nvPr/>
+      </p:nvGrpSpPr>
+      <p:grpSpPr>
+        <a:xfrm>
+          <a:off x="0" y="0"/>
+          <a:ext cx="0" cy="0"/>
+          <a:chOff x="0" y="0"/>
+          <a:chExt cx="0" cy="0"/>
+        </a:xfrm>
+      </p:grpSpPr>
+      <p:sp>
+        <p:nvSpPr>
+          <p:cNvPr id="2" name="TextBox 1">
+            <a:extLst>
+              <a:ext uri="{FF2B5EF4-FFF2-40B4-BE49-F238E27FC236}">
+                <a16:creationId xmlns:a16="http://schemas.microsoft.com/office/drawing/2014/main" id="{59E5665D-3379-40D0-8817-FD0C98372C54}"/>
+              </a:ext>
+            </a:extLst>
+          </p:cNvPr>
+          <p:cNvSpPr txBox="1"/>
+          <p:nvPr/>
+        </p:nvSpPr>
+        <p:spPr>
+          <a:xfrm>
+            <a:off x="95250" y="104775"/>
+            <a:ext cx="8104847" cy="523220"/>
+          </a:xfrm>
+          <a:prstGeom prst="rect">
+            <a:avLst/>
+          </a:prstGeom>
+          <a:noFill/>
+        </p:spPr>
+        <p:txBody>
+          <a:bodyPr wrap="none" rtlCol="0">
+            <a:spAutoFit/>
+          </a:bodyPr>
+          <a:lstStyle/>
+          <a:p>
+            <a:r>
+              <a:rPr lang="en-US" sz="2800" b="1" dirty="0">
+                <a:solidFill>
+                  <a:srgbClr val="0070C0"/>
+                </a:solidFill>
+              </a:rPr>
+              <a:t>AP + CFB: Pressure Control </a:t>
+            </a:r>
+            <a:r>
+              <a:rPr lang="en-US" sz="2000" b="1" dirty="0">
+                <a:solidFill>
+                  <a:srgbClr val="0070C0"/>
+                </a:solidFill>
+              </a:rPr>
+              <a:t>w/ new pressure profiles from MVM</a:t>
+            </a:r>
+          </a:p>
+        </p:txBody>
+      </p:sp>
+      <p:grpSp>
+        <p:nvGrpSpPr>
+          <p:cNvPr id="15" name="Group 14">
+            <a:extLst>
+              <a:ext uri="{FF2B5EF4-FFF2-40B4-BE49-F238E27FC236}">
+                <a16:creationId xmlns:a16="http://schemas.microsoft.com/office/drawing/2014/main" id="{9F049121-B586-44C6-9C37-4933B2530649}"/>
+              </a:ext>
+            </a:extLst>
+          </p:cNvPr>
+          <p:cNvGrpSpPr/>
+          <p:nvPr/>
+        </p:nvGrpSpPr>
+        <p:grpSpPr>
+          <a:xfrm>
+            <a:off x="402336" y="877824"/>
+            <a:ext cx="10560653" cy="5860066"/>
+            <a:chOff x="402336" y="877824"/>
+            <a:chExt cx="10560653" cy="5860066"/>
+          </a:xfrm>
+        </p:grpSpPr>
+        <p:pic>
+          <p:nvPicPr>
+            <p:cNvPr id="5" name="Picture 4">
+              <a:extLst>
+                <a:ext uri="{FF2B5EF4-FFF2-40B4-BE49-F238E27FC236}">
+                  <a16:creationId xmlns:a16="http://schemas.microsoft.com/office/drawing/2014/main" id="{DF635C99-5E75-48CB-9A60-784D2D9F2499}"/>
+                </a:ext>
+              </a:extLst>
+            </p:cNvPr>
+            <p:cNvPicPr>
+              <a:picLocks noChangeAspect="1"/>
+            </p:cNvPicPr>
+            <p:nvPr/>
+          </p:nvPicPr>
+          <p:blipFill>
+            <a:blip r:embed="rId2"/>
+            <a:stretch>
+              <a:fillRect/>
+            </a:stretch>
+          </p:blipFill>
+          <p:spPr>
+            <a:xfrm>
+              <a:off x="402336" y="877824"/>
+              <a:ext cx="10560653" cy="5860066"/>
+            </a:xfrm>
+            <a:prstGeom prst="rect">
+              <a:avLst/>
+            </a:prstGeom>
+          </p:spPr>
+        </p:pic>
+        <p:cxnSp>
+          <p:nvCxnSpPr>
+            <p:cNvPr id="8" name="Straight Arrow Connector 7">
+              <a:extLst>
+                <a:ext uri="{FF2B5EF4-FFF2-40B4-BE49-F238E27FC236}">
+                  <a16:creationId xmlns:a16="http://schemas.microsoft.com/office/drawing/2014/main" id="{5D9125D1-5134-4FBA-A6A4-B18BCCA107F3}"/>
+                </a:ext>
+              </a:extLst>
+            </p:cNvPr>
+            <p:cNvCxnSpPr>
+              <a:cxnSpLocks/>
+            </p:cNvCxnSpPr>
+            <p:nvPr/>
+          </p:nvCxnSpPr>
+          <p:spPr>
+            <a:xfrm flipV="1">
+              <a:off x="4852555" y="2961409"/>
+              <a:ext cx="0" cy="457200"/>
+            </a:xfrm>
+            <a:prstGeom prst="straightConnector1">
+              <a:avLst/>
+            </a:prstGeom>
+            <a:ln w="12700">
+              <a:solidFill>
+                <a:srgbClr val="FF0000"/>
+              </a:solidFill>
+              <a:headEnd type="triangle" w="lg" len="med"/>
+              <a:tailEnd type="triangle" w="lg" len="med"/>
+            </a:ln>
+          </p:spPr>
+          <p:style>
+            <a:lnRef idx="1">
+              <a:schemeClr val="accent1"/>
+            </a:lnRef>
+            <a:fillRef idx="0">
+              <a:schemeClr val="accent1"/>
+            </a:fillRef>
+            <a:effectRef idx="0">
+              <a:schemeClr val="accent1"/>
+            </a:effectRef>
+            <a:fontRef idx="minor">
+              <a:schemeClr val="tx1"/>
+            </a:fontRef>
+          </p:style>
+        </p:cxnSp>
+        <p:cxnSp>
+          <p:nvCxnSpPr>
+            <p:cNvPr id="11" name="Straight Arrow Connector 10">
+              <a:extLst>
+                <a:ext uri="{FF2B5EF4-FFF2-40B4-BE49-F238E27FC236}">
+                  <a16:creationId xmlns:a16="http://schemas.microsoft.com/office/drawing/2014/main" id="{E7EFA30E-6F8E-4091-9315-44710D55491B}"/>
+                </a:ext>
+              </a:extLst>
+            </p:cNvPr>
+            <p:cNvCxnSpPr>
+              <a:cxnSpLocks/>
+            </p:cNvCxnSpPr>
+            <p:nvPr/>
+          </p:nvCxnSpPr>
+          <p:spPr>
+            <a:xfrm flipV="1">
+              <a:off x="4852555" y="2597727"/>
+              <a:ext cx="446809" cy="270164"/>
+            </a:xfrm>
+            <a:prstGeom prst="straightConnector1">
+              <a:avLst/>
+            </a:prstGeom>
+            <a:ln w="12700">
+              <a:solidFill>
+                <a:srgbClr val="FF0000"/>
+              </a:solidFill>
+              <a:headEnd type="triangle" w="lg" len="med"/>
+              <a:tailEnd type="triangle" w="lg" len="med"/>
+            </a:ln>
+          </p:spPr>
+          <p:style>
+            <a:lnRef idx="1">
+              <a:schemeClr val="accent1"/>
+            </a:lnRef>
+            <a:fillRef idx="0">
+              <a:schemeClr val="accent1"/>
+            </a:fillRef>
+            <a:effectRef idx="0">
+              <a:schemeClr val="accent1"/>
+            </a:effectRef>
+            <a:fontRef idx="minor">
+              <a:schemeClr val="tx1"/>
+            </a:fontRef>
+          </p:style>
+        </p:cxnSp>
+        <p:sp>
+          <p:nvSpPr>
+            <p:cNvPr id="14" name="Oval 13">
+              <a:extLst>
+                <a:ext uri="{FF2B5EF4-FFF2-40B4-BE49-F238E27FC236}">
+                  <a16:creationId xmlns:a16="http://schemas.microsoft.com/office/drawing/2014/main" id="{ECFDF977-1AEF-4537-8982-BD1A1B9A66DF}"/>
+                </a:ext>
+              </a:extLst>
+            </p:cNvPr>
+            <p:cNvSpPr/>
+            <p:nvPr/>
+          </p:nvSpPr>
+          <p:spPr>
+            <a:xfrm>
+              <a:off x="4717473" y="4094018"/>
+              <a:ext cx="581883" cy="270164"/>
+            </a:xfrm>
+            <a:prstGeom prst="ellipse">
+              <a:avLst/>
+            </a:prstGeom>
+            <a:noFill/>
+            <a:ln>
+              <a:solidFill>
+                <a:srgbClr val="FF0000"/>
+              </a:solidFill>
+            </a:ln>
+          </p:spPr>
+          <p:style>
+            <a:lnRef idx="2">
+              <a:schemeClr val="accent1">
+                <a:shade val="50000"/>
+              </a:schemeClr>
+            </a:lnRef>
+            <a:fillRef idx="1">
+              <a:schemeClr val="accent1"/>
+            </a:fillRef>
+            <a:effectRef idx="0">
+              <a:schemeClr val="accent1"/>
+            </a:effectRef>
+            <a:fontRef idx="minor">
+              <a:schemeClr val="lt1"/>
+            </a:fontRef>
+          </p:style>
+          <p:txBody>
+            <a:bodyPr rtlCol="0" anchor="ctr"/>
+            <a:lstStyle/>
+            <a:p>
+              <a:pPr algn="ctr"/>
+              <a:endParaRPr lang="en-US"/>
+            </a:p>
+          </p:txBody>
+        </p:sp>
+      </p:grpSp>
+    </p:spTree>
+    <p:extLst>
+      <p:ext uri="{BB962C8B-B14F-4D97-AF65-F5344CB8AC3E}">
+        <p14:creationId xmlns:p14="http://schemas.microsoft.com/office/powerpoint/2010/main" val="2827634627"/>
+      </p:ext>
+    </p:extLst>
+  </p:cSld>
+  <p:clrMapOvr>
+    <a:masterClrMapping/>
+  </p:clrMapOvr>
+</p:sld>
+</file>
+
+<file path=ppt/slides/slide29.xml><?xml version="1.0" encoding="utf-8"?>
+<p:sld xmlns:a="http://schemas.openxmlformats.org/drawingml/2006/main" xmlns:r="http://schemas.openxmlformats.org/officeDocument/2006/relationships" xmlns:p="http://schemas.openxmlformats.org/presentationml/2006/main">
+  <p:cSld>
+    <p:spTree>
+      <p:nvGrpSpPr>
+        <p:cNvPr id="1" name=""/>
+        <p:cNvGrpSpPr/>
+        <p:nvPr/>
+      </p:nvGrpSpPr>
+      <p:grpSpPr>
+        <a:xfrm>
+          <a:off x="0" y="0"/>
+          <a:ext cx="0" cy="0"/>
+          <a:chOff x="0" y="0"/>
+          <a:chExt cx="0" cy="0"/>
+        </a:xfrm>
+      </p:grpSpPr>
+      <p:sp>
+        <p:nvSpPr>
+          <p:cNvPr id="2" name="TextBox 1">
+            <a:extLst>
+              <a:ext uri="{FF2B5EF4-FFF2-40B4-BE49-F238E27FC236}">
+                <a16:creationId xmlns:a16="http://schemas.microsoft.com/office/drawing/2014/main" id="{59E5665D-3379-40D0-8817-FD0C98372C54}"/>
+              </a:ext>
+            </a:extLst>
+          </p:cNvPr>
+          <p:cNvSpPr txBox="1"/>
+          <p:nvPr/>
+        </p:nvSpPr>
+        <p:spPr>
+          <a:xfrm>
+            <a:off x="95250" y="104775"/>
+            <a:ext cx="8104847" cy="523220"/>
+          </a:xfrm>
+          <a:prstGeom prst="rect">
+            <a:avLst/>
+          </a:prstGeom>
+          <a:noFill/>
+        </p:spPr>
+        <p:txBody>
+          <a:bodyPr wrap="none" rtlCol="0">
+            <a:spAutoFit/>
+          </a:bodyPr>
+          <a:lstStyle/>
+          <a:p>
+            <a:r>
+              <a:rPr lang="en-US" sz="2800" b="1" dirty="0">
+                <a:solidFill>
+                  <a:srgbClr val="0070C0"/>
+                </a:solidFill>
+              </a:rPr>
+              <a:t>AP + CFB: Pressure Control </a:t>
+            </a:r>
+            <a:r>
+              <a:rPr lang="en-US" sz="2000" b="1" dirty="0">
+                <a:solidFill>
+                  <a:srgbClr val="0070C0"/>
+                </a:solidFill>
+              </a:rPr>
+              <a:t>w/ new pressure profiles from MVM</a:t>
+            </a:r>
+          </a:p>
+        </p:txBody>
+      </p:sp>
+      <p:grpSp>
+        <p:nvGrpSpPr>
+          <p:cNvPr id="4" name="Group 3">
+            <a:extLst>
+              <a:ext uri="{FF2B5EF4-FFF2-40B4-BE49-F238E27FC236}">
+                <a16:creationId xmlns:a16="http://schemas.microsoft.com/office/drawing/2014/main" id="{DF6C297A-11E8-45D5-8F1A-4954FC2A9BE6}"/>
+              </a:ext>
+            </a:extLst>
+          </p:cNvPr>
+          <p:cNvGrpSpPr/>
+          <p:nvPr/>
+        </p:nvGrpSpPr>
+        <p:grpSpPr>
+          <a:xfrm>
+            <a:off x="402336" y="877824"/>
+            <a:ext cx="10560653" cy="5860066"/>
+            <a:chOff x="402336" y="877824"/>
+            <a:chExt cx="10560653" cy="5860066"/>
+          </a:xfrm>
+        </p:grpSpPr>
+        <p:pic>
+          <p:nvPicPr>
+            <p:cNvPr id="3" name="Picture 2">
+              <a:extLst>
+                <a:ext uri="{FF2B5EF4-FFF2-40B4-BE49-F238E27FC236}">
+                  <a16:creationId xmlns:a16="http://schemas.microsoft.com/office/drawing/2014/main" id="{DA455315-7434-48F8-98F8-5B982FF4EABB}"/>
+                </a:ext>
+              </a:extLst>
+            </p:cNvPr>
+            <p:cNvPicPr>
+              <a:picLocks noChangeAspect="1"/>
+            </p:cNvPicPr>
+            <p:nvPr/>
+          </p:nvPicPr>
+          <p:blipFill>
+            <a:blip r:embed="rId2"/>
+            <a:stretch>
+              <a:fillRect/>
+            </a:stretch>
+          </p:blipFill>
+          <p:spPr>
+            <a:xfrm>
+              <a:off x="402336" y="877824"/>
+              <a:ext cx="10560653" cy="5860066"/>
+            </a:xfrm>
+            <a:prstGeom prst="rect">
+              <a:avLst/>
+            </a:prstGeom>
+          </p:spPr>
+        </p:pic>
+        <p:sp>
+          <p:nvSpPr>
+            <p:cNvPr id="10" name="Oval 9">
+              <a:extLst>
+                <a:ext uri="{FF2B5EF4-FFF2-40B4-BE49-F238E27FC236}">
+                  <a16:creationId xmlns:a16="http://schemas.microsoft.com/office/drawing/2014/main" id="{C9933404-F666-4231-8BD6-A81933B6E699}"/>
+                </a:ext>
+              </a:extLst>
+            </p:cNvPr>
+            <p:cNvSpPr/>
+            <p:nvPr/>
+          </p:nvSpPr>
+          <p:spPr>
+            <a:xfrm rot="18257107">
+              <a:off x="826255" y="2625055"/>
+              <a:ext cx="805511" cy="270164"/>
+            </a:xfrm>
+            <a:prstGeom prst="ellipse">
+              <a:avLst/>
+            </a:prstGeom>
+            <a:noFill/>
+            <a:ln>
+              <a:solidFill>
+                <a:srgbClr val="FF0000"/>
+              </a:solidFill>
+            </a:ln>
+          </p:spPr>
+          <p:style>
+            <a:lnRef idx="2">
+              <a:schemeClr val="accent1">
+                <a:shade val="50000"/>
+              </a:schemeClr>
+            </a:lnRef>
+            <a:fillRef idx="1">
+              <a:schemeClr val="accent1"/>
+            </a:fillRef>
+            <a:effectRef idx="0">
+              <a:schemeClr val="accent1"/>
+            </a:effectRef>
+            <a:fontRef idx="minor">
+              <a:schemeClr val="lt1"/>
+            </a:fontRef>
+          </p:style>
+          <p:txBody>
+            <a:bodyPr rtlCol="0" anchor="ctr"/>
+            <a:lstStyle/>
+            <a:p>
+              <a:pPr algn="ctr"/>
+              <a:endParaRPr lang="en-US"/>
+            </a:p>
+          </p:txBody>
+        </p:sp>
+        <p:sp>
+          <p:nvSpPr>
+            <p:cNvPr id="12" name="Oval 11">
+              <a:extLst>
+                <a:ext uri="{FF2B5EF4-FFF2-40B4-BE49-F238E27FC236}">
+                  <a16:creationId xmlns:a16="http://schemas.microsoft.com/office/drawing/2014/main" id="{95B7638B-05FD-4E72-90D0-57F2ADB56B75}"/>
+                </a:ext>
+              </a:extLst>
+            </p:cNvPr>
+            <p:cNvSpPr/>
+            <p:nvPr/>
+          </p:nvSpPr>
+          <p:spPr>
+            <a:xfrm>
+              <a:off x="890522" y="3917371"/>
+              <a:ext cx="581883" cy="270164"/>
+            </a:xfrm>
+            <a:prstGeom prst="ellipse">
+              <a:avLst/>
+            </a:prstGeom>
+            <a:noFill/>
+            <a:ln>
+              <a:solidFill>
+                <a:srgbClr val="FF0000"/>
+              </a:solidFill>
+            </a:ln>
+          </p:spPr>
+          <p:style>
+            <a:lnRef idx="2">
+              <a:schemeClr val="accent1">
+                <a:shade val="50000"/>
+              </a:schemeClr>
+            </a:lnRef>
+            <a:fillRef idx="1">
+              <a:schemeClr val="accent1"/>
+            </a:fillRef>
+            <a:effectRef idx="0">
+              <a:schemeClr val="accent1"/>
+            </a:effectRef>
+            <a:fontRef idx="minor">
+              <a:schemeClr val="lt1"/>
+            </a:fontRef>
+          </p:style>
+          <p:txBody>
+            <a:bodyPr rtlCol="0" anchor="ctr"/>
+            <a:lstStyle/>
+            <a:p>
+              <a:pPr algn="ctr"/>
+              <a:endParaRPr lang="en-US"/>
+            </a:p>
+          </p:txBody>
+        </p:sp>
+      </p:grpSp>
+    </p:spTree>
+    <p:extLst>
+      <p:ext uri="{BB962C8B-B14F-4D97-AF65-F5344CB8AC3E}">
+        <p14:creationId xmlns:p14="http://schemas.microsoft.com/office/powerpoint/2010/main" val="631604294"/>
+      </p:ext>
+    </p:extLst>
+  </p:cSld>
+  <p:clrMapOvr>
+    <a:masterClrMapping/>
+  </p:clrMapOvr>
+</p:sld>
+</file>
+
 <file path=ppt/slides/slide3.xml><?xml version="1.0" encoding="utf-8"?>
 <p:sld xmlns:a="http://schemas.openxmlformats.org/drawingml/2006/main" xmlns:r="http://schemas.openxmlformats.org/officeDocument/2006/relationships" xmlns:p="http://schemas.openxmlformats.org/presentationml/2006/main">
   <p:cSld>
@@ -4917,6 +5538,113 @@
     <p:extLst>
       <p:ext uri="{BB962C8B-B14F-4D97-AF65-F5344CB8AC3E}">
         <p14:creationId xmlns:p14="http://schemas.microsoft.com/office/powerpoint/2010/main" val="1049786551"/>
+      </p:ext>
+    </p:extLst>
+  </p:cSld>
+  <p:clrMapOvr>
+    <a:masterClrMapping/>
+  </p:clrMapOvr>
+</p:sld>
+</file>
+
+<file path=ppt/slides/slide30.xml><?xml version="1.0" encoding="utf-8"?>
+<p:sld xmlns:a="http://schemas.openxmlformats.org/drawingml/2006/main" xmlns:r="http://schemas.openxmlformats.org/officeDocument/2006/relationships" xmlns:p="http://schemas.openxmlformats.org/presentationml/2006/main">
+  <p:cSld>
+    <p:spTree>
+      <p:nvGrpSpPr>
+        <p:cNvPr id="1" name=""/>
+        <p:cNvGrpSpPr/>
+        <p:nvPr/>
+      </p:nvGrpSpPr>
+      <p:grpSpPr>
+        <a:xfrm>
+          <a:off x="0" y="0"/>
+          <a:ext cx="0" cy="0"/>
+          <a:chOff x="0" y="0"/>
+          <a:chExt cx="0" cy="0"/>
+        </a:xfrm>
+      </p:grpSpPr>
+      <p:sp>
+        <p:nvSpPr>
+          <p:cNvPr id="2" name="TextBox 1">
+            <a:extLst>
+              <a:ext uri="{FF2B5EF4-FFF2-40B4-BE49-F238E27FC236}">
+                <a16:creationId xmlns:a16="http://schemas.microsoft.com/office/drawing/2014/main" id="{59E5665D-3379-40D0-8817-FD0C98372C54}"/>
+              </a:ext>
+            </a:extLst>
+          </p:cNvPr>
+          <p:cNvSpPr txBox="1"/>
+          <p:nvPr/>
+        </p:nvSpPr>
+        <p:spPr>
+          <a:xfrm>
+            <a:off x="95250" y="104775"/>
+            <a:ext cx="8077596" cy="523220"/>
+          </a:xfrm>
+          <a:prstGeom prst="rect">
+            <a:avLst/>
+          </a:prstGeom>
+          <a:noFill/>
+        </p:spPr>
+        <p:txBody>
+          <a:bodyPr wrap="none" rtlCol="0">
+            <a:spAutoFit/>
+          </a:bodyPr>
+          <a:lstStyle/>
+          <a:p>
+            <a:r>
+              <a:rPr lang="en-US" sz="2800" b="1" dirty="0">
+                <a:solidFill>
+                  <a:srgbClr val="0070C0"/>
+                </a:solidFill>
+              </a:rPr>
+              <a:t>CP + CFB: Pressure Control </a:t>
+            </a:r>
+            <a:r>
+              <a:rPr lang="en-US" sz="2000" b="1" dirty="0">
+                <a:solidFill>
+                  <a:srgbClr val="0070C0"/>
+                </a:solidFill>
+              </a:rPr>
+              <a:t>w/ new pressure profiles from MVM</a:t>
+            </a:r>
+          </a:p>
+        </p:txBody>
+      </p:sp>
+      <p:pic>
+        <p:nvPicPr>
+          <p:cNvPr id="4" name="Picture 3">
+            <a:extLst>
+              <a:ext uri="{FF2B5EF4-FFF2-40B4-BE49-F238E27FC236}">
+                <a16:creationId xmlns:a16="http://schemas.microsoft.com/office/drawing/2014/main" id="{AC8E38AA-3348-4BE3-8783-78BD431E8827}"/>
+              </a:ext>
+            </a:extLst>
+          </p:cNvPr>
+          <p:cNvPicPr>
+            <a:picLocks noChangeAspect="1"/>
+          </p:cNvPicPr>
+          <p:nvPr/>
+        </p:nvPicPr>
+        <p:blipFill>
+          <a:blip r:embed="rId2"/>
+          <a:stretch>
+            <a:fillRect/>
+          </a:stretch>
+        </p:blipFill>
+        <p:spPr>
+          <a:xfrm>
+            <a:off x="402336" y="877824"/>
+            <a:ext cx="10560653" cy="5860066"/>
+          </a:xfrm>
+          <a:prstGeom prst="rect">
+            <a:avLst/>
+          </a:prstGeom>
+        </p:spPr>
+      </p:pic>
+    </p:spTree>
+    <p:extLst>
+      <p:ext uri="{BB962C8B-B14F-4D97-AF65-F5344CB8AC3E}">
+        <p14:creationId xmlns:p14="http://schemas.microsoft.com/office/powerpoint/2010/main" val="2184847114"/>
       </p:ext>
     </p:extLst>
   </p:cSld>

</xml_diff>

<commit_message>
[ssc] CP tuned up w/ full dynamics
</commit_message>
<xml_diff>
--- a/models/simscape/analysis/analysis.pptx
+++ b/models/simscape/analysis/analysis.pptx
@@ -35,6 +35,7 @@
     <p:sldId id="287" r:id="rId29"/>
     <p:sldId id="288" r:id="rId30"/>
     <p:sldId id="289" r:id="rId31"/>
+    <p:sldId id="290" r:id="rId32"/>
   </p:sldIdLst>
   <p:sldSz cx="12192000" cy="6858000"/>
   <p:notesSz cx="6858000" cy="9144000"/>
@@ -5654,6 +5655,319 @@
 </p:sld>
 </file>
 
+<file path=ppt/slides/slide31.xml><?xml version="1.0" encoding="utf-8"?>
+<p:sld xmlns:a="http://schemas.openxmlformats.org/drawingml/2006/main" xmlns:r="http://schemas.openxmlformats.org/officeDocument/2006/relationships" xmlns:p="http://schemas.openxmlformats.org/presentationml/2006/main">
+  <p:cSld>
+    <p:spTree>
+      <p:nvGrpSpPr>
+        <p:cNvPr id="1" name=""/>
+        <p:cNvGrpSpPr/>
+        <p:nvPr/>
+      </p:nvGrpSpPr>
+      <p:grpSpPr>
+        <a:xfrm>
+          <a:off x="0" y="0"/>
+          <a:ext cx="0" cy="0"/>
+          <a:chOff x="0" y="0"/>
+          <a:chExt cx="0" cy="0"/>
+        </a:xfrm>
+      </p:grpSpPr>
+      <p:sp>
+        <p:nvSpPr>
+          <p:cNvPr id="2" name="TextBox 1">
+            <a:extLst>
+              <a:ext uri="{FF2B5EF4-FFF2-40B4-BE49-F238E27FC236}">
+                <a16:creationId xmlns:a16="http://schemas.microsoft.com/office/drawing/2014/main" id="{59E5665D-3379-40D0-8817-FD0C98372C54}"/>
+              </a:ext>
+            </a:extLst>
+          </p:cNvPr>
+          <p:cNvSpPr txBox="1"/>
+          <p:nvPr/>
+        </p:nvSpPr>
+        <p:spPr>
+          <a:xfrm>
+            <a:off x="95250" y="104775"/>
+            <a:ext cx="5958939" cy="523220"/>
+          </a:xfrm>
+          <a:prstGeom prst="rect">
+            <a:avLst/>
+          </a:prstGeom>
+          <a:noFill/>
+        </p:spPr>
+        <p:txBody>
+          <a:bodyPr wrap="none" rtlCol="0">
+            <a:spAutoFit/>
+          </a:bodyPr>
+          <a:lstStyle/>
+          <a:p>
+            <a:r>
+              <a:rPr lang="en-US" sz="2800" b="1" dirty="0">
+                <a:solidFill>
+                  <a:srgbClr val="0070C0"/>
+                </a:solidFill>
+              </a:rPr>
+              <a:t>CP + CFB: Pressure Control </a:t>
+            </a:r>
+            <a:r>
+              <a:rPr lang="en-US" sz="2000" b="1" dirty="0">
+                <a:solidFill>
+                  <a:srgbClr val="0070C0"/>
+                </a:solidFill>
+              </a:rPr>
+              <a:t>w/ full dynamics</a:t>
+            </a:r>
+          </a:p>
+        </p:txBody>
+      </p:sp>
+      <p:grpSp>
+        <p:nvGrpSpPr>
+          <p:cNvPr id="7" name="Group 6">
+            <a:extLst>
+              <a:ext uri="{FF2B5EF4-FFF2-40B4-BE49-F238E27FC236}">
+                <a16:creationId xmlns:a16="http://schemas.microsoft.com/office/drawing/2014/main" id="{0A9DCBF0-FBAE-4164-9F60-B3D7B6218FE7}"/>
+              </a:ext>
+            </a:extLst>
+          </p:cNvPr>
+          <p:cNvGrpSpPr/>
+          <p:nvPr/>
+        </p:nvGrpSpPr>
+        <p:grpSpPr>
+          <a:xfrm>
+            <a:off x="402336" y="877824"/>
+            <a:ext cx="10560653" cy="5842159"/>
+            <a:chOff x="402336" y="877824"/>
+            <a:chExt cx="10560653" cy="5842159"/>
+          </a:xfrm>
+        </p:grpSpPr>
+        <p:pic>
+          <p:nvPicPr>
+            <p:cNvPr id="3" name="Picture 2">
+              <a:extLst>
+                <a:ext uri="{FF2B5EF4-FFF2-40B4-BE49-F238E27FC236}">
+                  <a16:creationId xmlns:a16="http://schemas.microsoft.com/office/drawing/2014/main" id="{CD37D7BA-1CEA-4183-8AAA-76AE823CC723}"/>
+                </a:ext>
+              </a:extLst>
+            </p:cNvPr>
+            <p:cNvPicPr>
+              <a:picLocks noChangeAspect="1"/>
+            </p:cNvPicPr>
+            <p:nvPr/>
+          </p:nvPicPr>
+          <p:blipFill>
+            <a:blip r:embed="rId2"/>
+            <a:stretch>
+              <a:fillRect/>
+            </a:stretch>
+          </p:blipFill>
+          <p:spPr>
+            <a:xfrm>
+              <a:off x="402336" y="877824"/>
+              <a:ext cx="10560653" cy="5842159"/>
+            </a:xfrm>
+            <a:prstGeom prst="rect">
+              <a:avLst/>
+            </a:prstGeom>
+          </p:spPr>
+        </p:pic>
+        <p:sp>
+          <p:nvSpPr>
+            <p:cNvPr id="5" name="Oval 4">
+              <a:extLst>
+                <a:ext uri="{FF2B5EF4-FFF2-40B4-BE49-F238E27FC236}">
+                  <a16:creationId xmlns:a16="http://schemas.microsoft.com/office/drawing/2014/main" id="{1E9FABDA-FAF3-404B-AC52-2565112BF0BC}"/>
+                </a:ext>
+              </a:extLst>
+            </p:cNvPr>
+            <p:cNvSpPr/>
+            <p:nvPr/>
+          </p:nvSpPr>
+          <p:spPr>
+            <a:xfrm rot="16200000">
+              <a:off x="4662530" y="1178691"/>
+              <a:ext cx="572854" cy="270164"/>
+            </a:xfrm>
+            <a:prstGeom prst="ellipse">
+              <a:avLst/>
+            </a:prstGeom>
+            <a:noFill/>
+            <a:ln>
+              <a:solidFill>
+                <a:srgbClr val="FF0000"/>
+              </a:solidFill>
+            </a:ln>
+          </p:spPr>
+          <p:style>
+            <a:lnRef idx="2">
+              <a:schemeClr val="accent1">
+                <a:shade val="50000"/>
+              </a:schemeClr>
+            </a:lnRef>
+            <a:fillRef idx="1">
+              <a:schemeClr val="accent1"/>
+            </a:fillRef>
+            <a:effectRef idx="0">
+              <a:schemeClr val="accent1"/>
+            </a:effectRef>
+            <a:fontRef idx="minor">
+              <a:schemeClr val="lt1"/>
+            </a:fontRef>
+          </p:style>
+          <p:txBody>
+            <a:bodyPr rtlCol="0" anchor="ctr"/>
+            <a:lstStyle/>
+            <a:p>
+              <a:pPr algn="ctr"/>
+              <a:endParaRPr lang="en-US"/>
+            </a:p>
+          </p:txBody>
+        </p:sp>
+        <p:sp>
+          <p:nvSpPr>
+            <p:cNvPr id="6" name="TextBox 5">
+              <a:extLst>
+                <a:ext uri="{FF2B5EF4-FFF2-40B4-BE49-F238E27FC236}">
+                  <a16:creationId xmlns:a16="http://schemas.microsoft.com/office/drawing/2014/main" id="{37E7B3D1-A08A-4939-9764-AD650AA956BB}"/>
+                </a:ext>
+              </a:extLst>
+            </p:cNvPr>
+            <p:cNvSpPr txBox="1"/>
+            <p:nvPr/>
+          </p:nvSpPr>
+          <p:spPr>
+            <a:xfrm>
+              <a:off x="8387977" y="4095081"/>
+              <a:ext cx="2476897" cy="2369880"/>
+            </a:xfrm>
+            <a:prstGeom prst="rect">
+              <a:avLst/>
+            </a:prstGeom>
+            <a:solidFill>
+              <a:schemeClr val="bg1"/>
+            </a:solidFill>
+            <a:ln>
+              <a:solidFill>
+                <a:schemeClr val="accent1"/>
+              </a:solidFill>
+            </a:ln>
+          </p:spPr>
+          <p:txBody>
+            <a:bodyPr wrap="none" rtlCol="0">
+              <a:spAutoFit/>
+            </a:bodyPr>
+            <a:lstStyle/>
+            <a:p>
+              <a:r>
+                <a:rPr lang="en-US" dirty="0"/>
+                <a:t>Feedback Filtering</a:t>
+              </a:r>
+            </a:p>
+            <a:p>
+              <a:pPr marL="285750" indent="-285750">
+                <a:buFont typeface="Arial" panose="020B0604020202020204" pitchFamily="34" charset="0"/>
+                <a:buChar char="•"/>
+              </a:pPr>
+              <a:r>
+                <a:rPr lang="en-US" sz="1400" dirty="0"/>
+                <a:t>IIR 3</a:t>
+              </a:r>
+              <a:r>
+                <a:rPr lang="en-US" sz="1400" baseline="30000" dirty="0"/>
+                <a:t>rd</a:t>
+              </a:r>
+              <a:r>
+                <a:rPr lang="en-US" sz="1400" dirty="0"/>
+                <a:t> order</a:t>
+              </a:r>
+            </a:p>
+            <a:p>
+              <a:pPr marL="285750" indent="-285750">
+                <a:buFont typeface="Arial" panose="020B0604020202020204" pitchFamily="34" charset="0"/>
+                <a:buChar char="•"/>
+              </a:pPr>
+              <a:r>
+                <a:rPr lang="en-US" sz="1400" dirty="0"/>
+                <a:t>20 Hz cutoff </a:t>
+              </a:r>
+            </a:p>
+            <a:p>
+              <a:pPr marL="285750" indent="-285750">
+                <a:buFont typeface="Arial" panose="020B0604020202020204" pitchFamily="34" charset="0"/>
+                <a:buChar char="•"/>
+              </a:pPr>
+              <a:r>
+                <a:rPr lang="en-US" sz="1400" dirty="0"/>
+                <a:t>30 dB attenuation</a:t>
+              </a:r>
+            </a:p>
+            <a:p>
+              <a:pPr marL="285750" indent="-285750">
+                <a:buFont typeface="Arial" panose="020B0604020202020204" pitchFamily="34" charset="0"/>
+                <a:buChar char="•"/>
+              </a:pPr>
+              <a:r>
+                <a:rPr lang="en-US" sz="1400" dirty="0"/>
+                <a:t>0.5 dB passband max ripple</a:t>
+              </a:r>
+            </a:p>
+            <a:p>
+              <a:pPr marL="285750" indent="-285750">
+                <a:buFont typeface="Arial" panose="020B0604020202020204" pitchFamily="34" charset="0"/>
+                <a:buChar char="•"/>
+              </a:pPr>
+              <a:endParaRPr lang="en-US" sz="1400" dirty="0"/>
+            </a:p>
+            <a:p>
+              <a:r>
+                <a:rPr lang="en-US" dirty="0"/>
+                <a:t>PID Controller</a:t>
+              </a:r>
+            </a:p>
+            <a:p>
+              <a:pPr marL="285750" indent="-285750">
+                <a:buFont typeface="Arial" panose="020B0604020202020204" pitchFamily="34" charset="0"/>
+                <a:buChar char="•"/>
+              </a:pPr>
+              <a:r>
+                <a:rPr lang="en-US" sz="1400" dirty="0"/>
+                <a:t>FFW = 40 (%FS)</a:t>
+              </a:r>
+            </a:p>
+            <a:p>
+              <a:pPr marL="285750" indent="-285750">
+                <a:buFont typeface="Arial" panose="020B0604020202020204" pitchFamily="34" charset="0"/>
+                <a:buChar char="•"/>
+              </a:pPr>
+              <a:r>
+                <a:rPr lang="en-US" sz="1400" dirty="0"/>
+                <a:t>P = 5 (%FS/cmH2O)</a:t>
+              </a:r>
+            </a:p>
+            <a:p>
+              <a:pPr marL="285750" indent="-285750">
+                <a:buFont typeface="Arial" panose="020B0604020202020204" pitchFamily="34" charset="0"/>
+                <a:buChar char="•"/>
+              </a:pPr>
+              <a:r>
+                <a:rPr lang="en-US" sz="1400" dirty="0"/>
+                <a:t>I = 10 (%FS/(cmH2O*s))</a:t>
+              </a:r>
+            </a:p>
+          </p:txBody>
+        </p:sp>
+      </p:grpSp>
+    </p:spTree>
+    <p:extLst>
+      <p:ext uri="{BB962C8B-B14F-4D97-AF65-F5344CB8AC3E}">
+        <p14:creationId xmlns:p14="http://schemas.microsoft.com/office/powerpoint/2010/main" val="353410821"/>
+      </p:ext>
+    </p:extLst>
+  </p:cSld>
+  <p:clrMapOvr>
+    <a:masterClrMapping/>
+  </p:clrMapOvr>
+</p:sld>
+</file>
+
 <file path=ppt/slides/slide4.xml><?xml version="1.0" encoding="utf-8"?>
 <p:sld xmlns:a="http://schemas.openxmlformats.org/drawingml/2006/main" xmlns:r="http://schemas.openxmlformats.org/officeDocument/2006/relationships" xmlns:p="http://schemas.openxmlformats.org/presentationml/2006/main">
   <p:cSld>

</xml_diff>

<commit_message>
[ssc] provided analysis on CP w/ full dynamics
</commit_message>
<xml_diff>
--- a/models/simscape/analysis/analysis.pptx
+++ b/models/simscape/analysis/analysis.pptx
@@ -36,6 +36,7 @@
     <p:sldId id="288" r:id="rId30"/>
     <p:sldId id="289" r:id="rId31"/>
     <p:sldId id="290" r:id="rId32"/>
+    <p:sldId id="291" r:id="rId33"/>
   </p:sldIdLst>
   <p:sldSz cx="12192000" cy="6858000"/>
   <p:notesSz cx="6858000" cy="9144000"/>
@@ -5968,6 +5969,352 @@
 </p:sld>
 </file>
 
+<file path=ppt/slides/slide32.xml><?xml version="1.0" encoding="utf-8"?>
+<p:sld xmlns:a="http://schemas.openxmlformats.org/drawingml/2006/main" xmlns:r="http://schemas.openxmlformats.org/officeDocument/2006/relationships" xmlns:p="http://schemas.openxmlformats.org/presentationml/2006/main">
+  <p:cSld>
+    <p:spTree>
+      <p:nvGrpSpPr>
+        <p:cNvPr id="1" name=""/>
+        <p:cNvGrpSpPr/>
+        <p:nvPr/>
+      </p:nvGrpSpPr>
+      <p:grpSpPr>
+        <a:xfrm>
+          <a:off x="0" y="0"/>
+          <a:ext cx="0" cy="0"/>
+          <a:chOff x="0" y="0"/>
+          <a:chExt cx="0" cy="0"/>
+        </a:xfrm>
+      </p:grpSpPr>
+      <p:sp>
+        <p:nvSpPr>
+          <p:cNvPr id="2" name="TextBox 1">
+            <a:extLst>
+              <a:ext uri="{FF2B5EF4-FFF2-40B4-BE49-F238E27FC236}">
+                <a16:creationId xmlns:a16="http://schemas.microsoft.com/office/drawing/2014/main" id="{59E5665D-3379-40D0-8817-FD0C98372C54}"/>
+              </a:ext>
+            </a:extLst>
+          </p:cNvPr>
+          <p:cNvSpPr txBox="1"/>
+          <p:nvPr/>
+        </p:nvSpPr>
+        <p:spPr>
+          <a:xfrm>
+            <a:off x="95250" y="104775"/>
+            <a:ext cx="5958939" cy="523220"/>
+          </a:xfrm>
+          <a:prstGeom prst="rect">
+            <a:avLst/>
+          </a:prstGeom>
+          <a:noFill/>
+        </p:spPr>
+        <p:txBody>
+          <a:bodyPr wrap="none" rtlCol="0">
+            <a:spAutoFit/>
+          </a:bodyPr>
+          <a:lstStyle/>
+          <a:p>
+            <a:r>
+              <a:rPr lang="en-US" sz="2800" b="1" dirty="0">
+                <a:solidFill>
+                  <a:srgbClr val="0070C0"/>
+                </a:solidFill>
+              </a:rPr>
+              <a:t>CP + CFB: Pressure Control </a:t>
+            </a:r>
+            <a:r>
+              <a:rPr lang="en-US" sz="2000" b="1" dirty="0">
+                <a:solidFill>
+                  <a:srgbClr val="0070C0"/>
+                </a:solidFill>
+              </a:rPr>
+              <a:t>w/ full dynamics</a:t>
+            </a:r>
+          </a:p>
+        </p:txBody>
+      </p:sp>
+      <p:grpSp>
+        <p:nvGrpSpPr>
+          <p:cNvPr id="15" name="Group 14">
+            <a:extLst>
+              <a:ext uri="{FF2B5EF4-FFF2-40B4-BE49-F238E27FC236}">
+                <a16:creationId xmlns:a16="http://schemas.microsoft.com/office/drawing/2014/main" id="{DA8561C5-E07F-4D1F-9C86-94B31260161C}"/>
+              </a:ext>
+            </a:extLst>
+          </p:cNvPr>
+          <p:cNvGrpSpPr/>
+          <p:nvPr/>
+        </p:nvGrpSpPr>
+        <p:grpSpPr>
+          <a:xfrm>
+            <a:off x="402336" y="877824"/>
+            <a:ext cx="10560653" cy="5842159"/>
+            <a:chOff x="402336" y="877824"/>
+            <a:chExt cx="10560653" cy="5842159"/>
+          </a:xfrm>
+        </p:grpSpPr>
+        <p:pic>
+          <p:nvPicPr>
+            <p:cNvPr id="4" name="Picture 3">
+              <a:extLst>
+                <a:ext uri="{FF2B5EF4-FFF2-40B4-BE49-F238E27FC236}">
+                  <a16:creationId xmlns:a16="http://schemas.microsoft.com/office/drawing/2014/main" id="{304E1485-BE32-482E-AB7C-D3574F2D72B5}"/>
+                </a:ext>
+              </a:extLst>
+            </p:cNvPr>
+            <p:cNvPicPr>
+              <a:picLocks noChangeAspect="1"/>
+            </p:cNvPicPr>
+            <p:nvPr/>
+          </p:nvPicPr>
+          <p:blipFill>
+            <a:blip r:embed="rId2"/>
+            <a:stretch>
+              <a:fillRect/>
+            </a:stretch>
+          </p:blipFill>
+          <p:spPr>
+            <a:xfrm>
+              <a:off x="402336" y="877824"/>
+              <a:ext cx="10560653" cy="5842159"/>
+            </a:xfrm>
+            <a:prstGeom prst="rect">
+              <a:avLst/>
+            </a:prstGeom>
+          </p:spPr>
+        </p:pic>
+        <p:sp>
+          <p:nvSpPr>
+            <p:cNvPr id="8" name="TextBox 7">
+              <a:extLst>
+                <a:ext uri="{FF2B5EF4-FFF2-40B4-BE49-F238E27FC236}">
+                  <a16:creationId xmlns:a16="http://schemas.microsoft.com/office/drawing/2014/main" id="{C4026858-4C2B-45E9-8866-D0AE0D866FA8}"/>
+                </a:ext>
+              </a:extLst>
+            </p:cNvPr>
+            <p:cNvSpPr txBox="1"/>
+            <p:nvPr/>
+          </p:nvSpPr>
+          <p:spPr>
+            <a:xfrm>
+              <a:off x="8387977" y="4095081"/>
+              <a:ext cx="2476897" cy="2369880"/>
+            </a:xfrm>
+            <a:prstGeom prst="rect">
+              <a:avLst/>
+            </a:prstGeom>
+            <a:solidFill>
+              <a:schemeClr val="bg1"/>
+            </a:solidFill>
+            <a:ln>
+              <a:solidFill>
+                <a:schemeClr val="accent1"/>
+              </a:solidFill>
+            </a:ln>
+          </p:spPr>
+          <p:txBody>
+            <a:bodyPr wrap="none" rtlCol="0">
+              <a:spAutoFit/>
+            </a:bodyPr>
+            <a:lstStyle/>
+            <a:p>
+              <a:r>
+                <a:rPr lang="en-US" dirty="0"/>
+                <a:t>Feedback Filtering</a:t>
+              </a:r>
+            </a:p>
+            <a:p>
+              <a:pPr marL="285750" indent="-285750">
+                <a:buFont typeface="Arial" panose="020B0604020202020204" pitchFamily="34" charset="0"/>
+                <a:buChar char="•"/>
+              </a:pPr>
+              <a:r>
+                <a:rPr lang="en-US" sz="1400" dirty="0"/>
+                <a:t>IIR 3</a:t>
+              </a:r>
+              <a:r>
+                <a:rPr lang="en-US" sz="1400" baseline="30000" dirty="0"/>
+                <a:t>rd</a:t>
+              </a:r>
+              <a:r>
+                <a:rPr lang="en-US" sz="1400" dirty="0"/>
+                <a:t> order</a:t>
+              </a:r>
+            </a:p>
+            <a:p>
+              <a:pPr marL="285750" indent="-285750">
+                <a:buFont typeface="Arial" panose="020B0604020202020204" pitchFamily="34" charset="0"/>
+                <a:buChar char="•"/>
+              </a:pPr>
+              <a:r>
+                <a:rPr lang="en-US" sz="1400" dirty="0"/>
+                <a:t>20 Hz cutoff </a:t>
+              </a:r>
+            </a:p>
+            <a:p>
+              <a:pPr marL="285750" indent="-285750">
+                <a:buFont typeface="Arial" panose="020B0604020202020204" pitchFamily="34" charset="0"/>
+                <a:buChar char="•"/>
+              </a:pPr>
+              <a:r>
+                <a:rPr lang="en-US" sz="1400" dirty="0"/>
+                <a:t>30 dB attenuation</a:t>
+              </a:r>
+            </a:p>
+            <a:p>
+              <a:pPr marL="285750" indent="-285750">
+                <a:buFont typeface="Arial" panose="020B0604020202020204" pitchFamily="34" charset="0"/>
+                <a:buChar char="•"/>
+              </a:pPr>
+              <a:r>
+                <a:rPr lang="en-US" sz="1400" dirty="0"/>
+                <a:t>0.5 dB passband max ripple</a:t>
+              </a:r>
+            </a:p>
+            <a:p>
+              <a:pPr marL="285750" indent="-285750">
+                <a:buFont typeface="Arial" panose="020B0604020202020204" pitchFamily="34" charset="0"/>
+                <a:buChar char="•"/>
+              </a:pPr>
+              <a:endParaRPr lang="en-US" sz="1400" dirty="0"/>
+            </a:p>
+            <a:p>
+              <a:r>
+                <a:rPr lang="en-US" dirty="0"/>
+                <a:t>PID Controller</a:t>
+              </a:r>
+            </a:p>
+            <a:p>
+              <a:pPr marL="285750" indent="-285750">
+                <a:buFont typeface="Arial" panose="020B0604020202020204" pitchFamily="34" charset="0"/>
+                <a:buChar char="•"/>
+              </a:pPr>
+              <a:r>
+                <a:rPr lang="en-US" sz="1400" dirty="0"/>
+                <a:t>FFW = 40 (%FS)</a:t>
+              </a:r>
+            </a:p>
+            <a:p>
+              <a:pPr marL="285750" indent="-285750">
+                <a:buFont typeface="Arial" panose="020B0604020202020204" pitchFamily="34" charset="0"/>
+                <a:buChar char="•"/>
+              </a:pPr>
+              <a:r>
+                <a:rPr lang="en-US" sz="1400" dirty="0"/>
+                <a:t>P = 5 (%FS/cmH2O)</a:t>
+              </a:r>
+            </a:p>
+            <a:p>
+              <a:pPr marL="285750" indent="-285750">
+                <a:buFont typeface="Arial" panose="020B0604020202020204" pitchFamily="34" charset="0"/>
+                <a:buChar char="•"/>
+              </a:pPr>
+              <a:r>
+                <a:rPr lang="en-US" sz="1400" dirty="0"/>
+                <a:t>I = 10 (%FS/(cmH2O*s))</a:t>
+              </a:r>
+            </a:p>
+          </p:txBody>
+        </p:sp>
+        <p:cxnSp>
+          <p:nvCxnSpPr>
+            <p:cNvPr id="9" name="Straight Arrow Connector 8">
+              <a:extLst>
+                <a:ext uri="{FF2B5EF4-FFF2-40B4-BE49-F238E27FC236}">
+                  <a16:creationId xmlns:a16="http://schemas.microsoft.com/office/drawing/2014/main" id="{6336A740-7131-4C34-8B2D-8DAD378C7B6B}"/>
+                </a:ext>
+              </a:extLst>
+            </p:cNvPr>
+            <p:cNvCxnSpPr>
+              <a:cxnSpLocks/>
+              <a:endCxn id="12" idx="1"/>
+            </p:cNvCxnSpPr>
+            <p:nvPr/>
+          </p:nvCxnSpPr>
+          <p:spPr>
+            <a:xfrm>
+              <a:off x="4998027" y="1226128"/>
+              <a:ext cx="580496" cy="0"/>
+            </a:xfrm>
+            <a:prstGeom prst="straightConnector1">
+              <a:avLst/>
+            </a:prstGeom>
+            <a:ln w="12700">
+              <a:solidFill>
+                <a:srgbClr val="FF0000"/>
+              </a:solidFill>
+              <a:headEnd type="triangle" w="lg" len="med"/>
+              <a:tailEnd type="none" w="lg" len="med"/>
+            </a:ln>
+          </p:spPr>
+          <p:style>
+            <a:lnRef idx="1">
+              <a:schemeClr val="accent1"/>
+            </a:lnRef>
+            <a:fillRef idx="0">
+              <a:schemeClr val="accent1"/>
+            </a:fillRef>
+            <a:effectRef idx="0">
+              <a:schemeClr val="accent1"/>
+            </a:effectRef>
+            <a:fontRef idx="minor">
+              <a:schemeClr val="tx1"/>
+            </a:fontRef>
+          </p:style>
+        </p:cxnSp>
+        <p:sp>
+          <p:nvSpPr>
+            <p:cNvPr id="12" name="TextBox 11">
+              <a:extLst>
+                <a:ext uri="{FF2B5EF4-FFF2-40B4-BE49-F238E27FC236}">
+                  <a16:creationId xmlns:a16="http://schemas.microsoft.com/office/drawing/2014/main" id="{D7DA20B3-18B4-40C4-A3F5-25F6253B2B28}"/>
+                </a:ext>
+              </a:extLst>
+            </p:cNvPr>
+            <p:cNvSpPr txBox="1"/>
+            <p:nvPr/>
+          </p:nvSpPr>
+          <p:spPr>
+            <a:xfrm>
+              <a:off x="5578523" y="1041462"/>
+              <a:ext cx="727828" cy="369332"/>
+            </a:xfrm>
+            <a:prstGeom prst="rect">
+              <a:avLst/>
+            </a:prstGeom>
+            <a:noFill/>
+          </p:spPr>
+          <p:txBody>
+            <a:bodyPr wrap="none" rtlCol="0">
+              <a:spAutoFit/>
+            </a:bodyPr>
+            <a:lstStyle/>
+            <a:p>
+              <a:r>
+                <a:rPr lang="en-US" dirty="0">
+                  <a:solidFill>
+                    <a:srgbClr val="FF0000"/>
+                  </a:solidFill>
+                </a:rPr>
+                <a:t>larger</a:t>
+              </a:r>
+            </a:p>
+          </p:txBody>
+        </p:sp>
+      </p:grpSp>
+    </p:spTree>
+    <p:extLst>
+      <p:ext uri="{BB962C8B-B14F-4D97-AF65-F5344CB8AC3E}">
+        <p14:creationId xmlns:p14="http://schemas.microsoft.com/office/powerpoint/2010/main" val="2144139218"/>
+      </p:ext>
+    </p:extLst>
+  </p:cSld>
+  <p:clrMapOvr>
+    <a:masterClrMapping/>
+  </p:clrMapOvr>
+</p:sld>
+</file>
+
 <file path=ppt/slides/slide4.xml><?xml version="1.0" encoding="utf-8"?>
 <p:sld xmlns:a="http://schemas.openxmlformats.org/drawingml/2006/main" xmlns:r="http://schemas.openxmlformats.org/officeDocument/2006/relationships" xmlns:p="http://schemas.openxmlformats.org/presentationml/2006/main">
   <p:cSld>

</xml_diff>

<commit_message>
[ssc] added CP fopdt
</commit_message>
<xml_diff>
--- a/models/simscape/analysis/analysis.pptx
+++ b/models/simscape/analysis/analysis.pptx
@@ -37,6 +37,7 @@
     <p:sldId id="289" r:id="rId31"/>
     <p:sldId id="290" r:id="rId32"/>
     <p:sldId id="291" r:id="rId33"/>
+    <p:sldId id="292" r:id="rId34"/>
   </p:sldIdLst>
   <p:sldSz cx="12192000" cy="6858000"/>
   <p:notesSz cx="6858000" cy="9144000"/>
@@ -6315,6 +6316,262 @@
 </p:sld>
 </file>
 
+<file path=ppt/slides/slide33.xml><?xml version="1.0" encoding="utf-8"?>
+<p:sld xmlns:a="http://schemas.openxmlformats.org/drawingml/2006/main" xmlns:r="http://schemas.openxmlformats.org/officeDocument/2006/relationships" xmlns:p="http://schemas.openxmlformats.org/presentationml/2006/main">
+  <p:cSld>
+    <p:spTree>
+      <p:nvGrpSpPr>
+        <p:cNvPr id="1" name=""/>
+        <p:cNvGrpSpPr/>
+        <p:nvPr/>
+      </p:nvGrpSpPr>
+      <p:grpSpPr>
+        <a:xfrm>
+          <a:off x="0" y="0"/>
+          <a:ext cx="0" cy="0"/>
+          <a:chOff x="0" y="0"/>
+          <a:chExt cx="0" cy="0"/>
+        </a:xfrm>
+      </p:grpSpPr>
+      <p:pic>
+        <p:nvPicPr>
+          <p:cNvPr id="2" name="Picture 1">
+            <a:extLst>
+              <a:ext uri="{FF2B5EF4-FFF2-40B4-BE49-F238E27FC236}">
+                <a16:creationId xmlns:a16="http://schemas.microsoft.com/office/drawing/2014/main" id="{2C71E10E-FBFA-4058-BCA9-10515AFED45A}"/>
+              </a:ext>
+            </a:extLst>
+          </p:cNvPr>
+          <p:cNvPicPr>
+            <a:picLocks noChangeAspect="1"/>
+          </p:cNvPicPr>
+          <p:nvPr/>
+        </p:nvPicPr>
+        <p:blipFill>
+          <a:blip r:embed="rId2"/>
+          <a:stretch>
+            <a:fillRect/>
+          </a:stretch>
+        </p:blipFill>
+        <p:spPr>
+          <a:xfrm>
+            <a:off x="402336" y="877824"/>
+            <a:ext cx="10560653" cy="5842159"/>
+          </a:xfrm>
+          <a:prstGeom prst="rect">
+            <a:avLst/>
+          </a:prstGeom>
+        </p:spPr>
+      </p:pic>
+      <p:sp>
+        <p:nvSpPr>
+          <p:cNvPr id="3" name="TextBox 2">
+            <a:extLst>
+              <a:ext uri="{FF2B5EF4-FFF2-40B4-BE49-F238E27FC236}">
+                <a16:creationId xmlns:a16="http://schemas.microsoft.com/office/drawing/2014/main" id="{C80C2A4C-1420-40B1-AB26-B4F874DC1CDA}"/>
+              </a:ext>
+            </a:extLst>
+          </p:cNvPr>
+          <p:cNvSpPr txBox="1"/>
+          <p:nvPr/>
+        </p:nvSpPr>
+        <p:spPr>
+          <a:xfrm>
+            <a:off x="95250" y="104775"/>
+            <a:ext cx="10024476" cy="523220"/>
+          </a:xfrm>
+          <a:prstGeom prst="rect">
+            <a:avLst/>
+          </a:prstGeom>
+          <a:noFill/>
+        </p:spPr>
+        <p:txBody>
+          <a:bodyPr wrap="none" rtlCol="0">
+            <a:spAutoFit/>
+          </a:bodyPr>
+          <a:lstStyle/>
+          <a:p>
+            <a:r>
+              <a:rPr lang="en-US" sz="2800" b="1" dirty="0">
+                <a:solidFill>
+                  <a:srgbClr val="0070C0"/>
+                </a:solidFill>
+              </a:rPr>
+              <a:t>CP + CFB: Pressure Control </a:t>
+            </a:r>
+            <a:r>
+              <a:rPr lang="en-US" sz="2000" b="1" dirty="0">
+                <a:solidFill>
+                  <a:srgbClr val="0070C0"/>
+                </a:solidFill>
+              </a:rPr>
+              <a:t>w/ FOPDT representing full </a:t>
+            </a:r>
+            <a:r>
+              <a:rPr lang="en-US" sz="2000" b="1">
+                <a:solidFill>
+                  <a:srgbClr val="0070C0"/>
+                </a:solidFill>
+              </a:rPr>
+              <a:t>dynamics w/ Series </a:t>
+            </a:r>
+            <a:r>
+              <a:rPr lang="en-US" sz="2000" b="1" dirty="0">
+                <a:solidFill>
+                  <a:srgbClr val="0070C0"/>
+                </a:solidFill>
+              </a:rPr>
+              <a:t>130 evo</a:t>
+            </a:r>
+          </a:p>
+        </p:txBody>
+      </p:sp>
+      <p:sp>
+        <p:nvSpPr>
+          <p:cNvPr id="4" name="TextBox 3">
+            <a:extLst>
+              <a:ext uri="{FF2B5EF4-FFF2-40B4-BE49-F238E27FC236}">
+                <a16:creationId xmlns:a16="http://schemas.microsoft.com/office/drawing/2014/main" id="{23B6544D-CE59-4BE6-B8E6-D8B23E971FAE}"/>
+              </a:ext>
+            </a:extLst>
+          </p:cNvPr>
+          <p:cNvSpPr txBox="1"/>
+          <p:nvPr/>
+        </p:nvSpPr>
+        <p:spPr>
+          <a:xfrm>
+            <a:off x="8387977" y="4095081"/>
+            <a:ext cx="2476897" cy="2369880"/>
+          </a:xfrm>
+          <a:prstGeom prst="rect">
+            <a:avLst/>
+          </a:prstGeom>
+          <a:solidFill>
+            <a:schemeClr val="bg1"/>
+          </a:solidFill>
+          <a:ln>
+            <a:solidFill>
+              <a:schemeClr val="accent1"/>
+            </a:solidFill>
+          </a:ln>
+        </p:spPr>
+        <p:txBody>
+          <a:bodyPr wrap="none" rtlCol="0">
+            <a:spAutoFit/>
+          </a:bodyPr>
+          <a:lstStyle/>
+          <a:p>
+            <a:r>
+              <a:rPr lang="en-US" dirty="0"/>
+              <a:t>Feedback Filtering</a:t>
+            </a:r>
+          </a:p>
+          <a:p>
+            <a:pPr marL="285750" indent="-285750">
+              <a:buFont typeface="Arial" panose="020B0604020202020204" pitchFamily="34" charset="0"/>
+              <a:buChar char="•"/>
+            </a:pPr>
+            <a:r>
+              <a:rPr lang="en-US" sz="1400" dirty="0"/>
+              <a:t>IIR 3</a:t>
+            </a:r>
+            <a:r>
+              <a:rPr lang="en-US" sz="1400" baseline="30000" dirty="0"/>
+              <a:t>rd</a:t>
+            </a:r>
+            <a:r>
+              <a:rPr lang="en-US" sz="1400" dirty="0"/>
+              <a:t> order</a:t>
+            </a:r>
+          </a:p>
+          <a:p>
+            <a:pPr marL="285750" indent="-285750">
+              <a:buFont typeface="Arial" panose="020B0604020202020204" pitchFamily="34" charset="0"/>
+              <a:buChar char="•"/>
+            </a:pPr>
+            <a:r>
+              <a:rPr lang="en-US" sz="1400" dirty="0"/>
+              <a:t>10 Hz cutoff </a:t>
+            </a:r>
+          </a:p>
+          <a:p>
+            <a:pPr marL="285750" indent="-285750">
+              <a:buFont typeface="Arial" panose="020B0604020202020204" pitchFamily="34" charset="0"/>
+              <a:buChar char="•"/>
+            </a:pPr>
+            <a:r>
+              <a:rPr lang="en-US" sz="1400" dirty="0"/>
+              <a:t>30 dB attenuation</a:t>
+            </a:r>
+          </a:p>
+          <a:p>
+            <a:pPr marL="285750" indent="-285750">
+              <a:buFont typeface="Arial" panose="020B0604020202020204" pitchFamily="34" charset="0"/>
+              <a:buChar char="•"/>
+            </a:pPr>
+            <a:r>
+              <a:rPr lang="en-US" sz="1400" dirty="0"/>
+              <a:t>0.5 dB passband max ripple</a:t>
+            </a:r>
+          </a:p>
+          <a:p>
+            <a:pPr marL="285750" indent="-285750">
+              <a:buFont typeface="Arial" panose="020B0604020202020204" pitchFamily="34" charset="0"/>
+              <a:buChar char="•"/>
+            </a:pPr>
+            <a:endParaRPr lang="en-US" sz="1400" dirty="0"/>
+          </a:p>
+          <a:p>
+            <a:r>
+              <a:rPr lang="en-US" dirty="0"/>
+              <a:t>PID Controller</a:t>
+            </a:r>
+          </a:p>
+          <a:p>
+            <a:pPr marL="285750" indent="-285750">
+              <a:buFont typeface="Arial" panose="020B0604020202020204" pitchFamily="34" charset="0"/>
+              <a:buChar char="•"/>
+            </a:pPr>
+            <a:r>
+              <a:rPr lang="en-US" sz="1400" dirty="0"/>
+              <a:t>FFW = 35 (%FS)</a:t>
+            </a:r>
+          </a:p>
+          <a:p>
+            <a:pPr marL="285750" indent="-285750">
+              <a:buFont typeface="Arial" panose="020B0604020202020204" pitchFamily="34" charset="0"/>
+              <a:buChar char="•"/>
+            </a:pPr>
+            <a:r>
+              <a:rPr lang="en-US" sz="1400" dirty="0"/>
+              <a:t>P = 1 (%FS/cmH2O)</a:t>
+            </a:r>
+          </a:p>
+          <a:p>
+            <a:pPr marL="285750" indent="-285750">
+              <a:buFont typeface="Arial" panose="020B0604020202020204" pitchFamily="34" charset="0"/>
+              <a:buChar char="•"/>
+            </a:pPr>
+            <a:r>
+              <a:rPr lang="en-US" sz="1400" dirty="0"/>
+              <a:t>I = 30 (%FS/(cmH2O*s))</a:t>
+            </a:r>
+          </a:p>
+        </p:txBody>
+      </p:sp>
+    </p:spTree>
+    <p:extLst>
+      <p:ext uri="{BB962C8B-B14F-4D97-AF65-F5344CB8AC3E}">
+        <p14:creationId xmlns:p14="http://schemas.microsoft.com/office/powerpoint/2010/main" val="2888715965"/>
+      </p:ext>
+    </p:extLst>
+  </p:cSld>
+  <p:clrMapOvr>
+    <a:masterClrMapping/>
+  </p:clrMapOvr>
+</p:sld>
+</file>
+
 <file path=ppt/slides/slide4.xml><?xml version="1.0" encoding="utf-8"?>
 <p:sld xmlns:a="http://schemas.openxmlformats.org/drawingml/2006/main" xmlns:r="http://schemas.openxmlformats.org/officeDocument/2006/relationships" xmlns:p="http://schemas.openxmlformats.org/presentationml/2006/main">
   <p:cSld>

</xml_diff>